<commit_message>
Mesures of memory size
</commit_message>
<xml_diff>
--- a/Presentation.pptx
+++ b/Presentation.pptx
@@ -8,13 +8,14 @@
     <p:sldId id="256" r:id="rId2"/>
     <p:sldId id="258" r:id="rId3"/>
     <p:sldId id="257" r:id="rId4"/>
-    <p:sldId id="259" r:id="rId5"/>
-    <p:sldId id="260" r:id="rId6"/>
-    <p:sldId id="261" r:id="rId7"/>
+    <p:sldId id="260" r:id="rId5"/>
+    <p:sldId id="261" r:id="rId6"/>
+    <p:sldId id="266" r:id="rId7"/>
     <p:sldId id="262" r:id="rId8"/>
     <p:sldId id="263" r:id="rId9"/>
     <p:sldId id="264" r:id="rId10"/>
-    <p:sldId id="265" r:id="rId11"/>
+    <p:sldId id="268" r:id="rId11"/>
+    <p:sldId id="267" r:id="rId12"/>
   </p:sldIdLst>
   <p:sldSz cx="9144000" cy="6858000" type="screen4x3"/>
   <p:notesSz cx="6858000" cy="9144000"/>
@@ -297,6 +298,7 @@
           <a:p>
             <a:fld id="{6F42DEA7-74B5-471C-821F-4935DF9D1E3D}" type="datetimeFigureOut">
               <a:rPr lang="fr-FR" smtClean="0"/>
+              <a:pPr/>
               <a:t>17/02/2015</a:t>
             </a:fld>
             <a:endParaRPr lang="fr-FR"/>
@@ -339,6 +341,7 @@
           <a:p>
             <a:fld id="{1746E4B8-61F3-46AC-806F-C2C8A0B5636C}" type="slidenum">
               <a:rPr lang="fr-FR" smtClean="0"/>
+              <a:pPr/>
               <a:t>‹N°›</a:t>
             </a:fld>
             <a:endParaRPr lang="fr-FR"/>
@@ -462,6 +465,7 @@
           <a:p>
             <a:fld id="{6F42DEA7-74B5-471C-821F-4935DF9D1E3D}" type="datetimeFigureOut">
               <a:rPr lang="fr-FR" smtClean="0"/>
+              <a:pPr/>
               <a:t>17/02/2015</a:t>
             </a:fld>
             <a:endParaRPr lang="fr-FR"/>
@@ -504,6 +508,7 @@
           <a:p>
             <a:fld id="{1746E4B8-61F3-46AC-806F-C2C8A0B5636C}" type="slidenum">
               <a:rPr lang="fr-FR" smtClean="0"/>
+              <a:pPr/>
               <a:t>‹N°›</a:t>
             </a:fld>
             <a:endParaRPr lang="fr-FR"/>
@@ -637,6 +642,7 @@
           <a:p>
             <a:fld id="{6F42DEA7-74B5-471C-821F-4935DF9D1E3D}" type="datetimeFigureOut">
               <a:rPr lang="fr-FR" smtClean="0"/>
+              <a:pPr/>
               <a:t>17/02/2015</a:t>
             </a:fld>
             <a:endParaRPr lang="fr-FR"/>
@@ -679,6 +685,7 @@
           <a:p>
             <a:fld id="{1746E4B8-61F3-46AC-806F-C2C8A0B5636C}" type="slidenum">
               <a:rPr lang="fr-FR" smtClean="0"/>
+              <a:pPr/>
               <a:t>‹N°›</a:t>
             </a:fld>
             <a:endParaRPr lang="fr-FR"/>
@@ -802,6 +809,7 @@
           <a:p>
             <a:fld id="{6F42DEA7-74B5-471C-821F-4935DF9D1E3D}" type="datetimeFigureOut">
               <a:rPr lang="fr-FR" smtClean="0"/>
+              <a:pPr/>
               <a:t>17/02/2015</a:t>
             </a:fld>
             <a:endParaRPr lang="fr-FR"/>
@@ -844,6 +852,7 @@
           <a:p>
             <a:fld id="{1746E4B8-61F3-46AC-806F-C2C8A0B5636C}" type="slidenum">
               <a:rPr lang="fr-FR" smtClean="0"/>
+              <a:pPr/>
               <a:t>‹N°›</a:t>
             </a:fld>
             <a:endParaRPr lang="fr-FR"/>
@@ -1043,6 +1052,7 @@
           <a:p>
             <a:fld id="{6F42DEA7-74B5-471C-821F-4935DF9D1E3D}" type="datetimeFigureOut">
               <a:rPr lang="fr-FR" smtClean="0"/>
+              <a:pPr/>
               <a:t>17/02/2015</a:t>
             </a:fld>
             <a:endParaRPr lang="fr-FR"/>
@@ -1085,6 +1095,7 @@
           <a:p>
             <a:fld id="{1746E4B8-61F3-46AC-806F-C2C8A0B5636C}" type="slidenum">
               <a:rPr lang="fr-FR" smtClean="0"/>
+              <a:pPr/>
               <a:t>‹N°›</a:t>
             </a:fld>
             <a:endParaRPr lang="fr-FR"/>
@@ -1326,6 +1337,7 @@
           <a:p>
             <a:fld id="{6F42DEA7-74B5-471C-821F-4935DF9D1E3D}" type="datetimeFigureOut">
               <a:rPr lang="fr-FR" smtClean="0"/>
+              <a:pPr/>
               <a:t>17/02/2015</a:t>
             </a:fld>
             <a:endParaRPr lang="fr-FR"/>
@@ -1368,6 +1380,7 @@
           <a:p>
             <a:fld id="{1746E4B8-61F3-46AC-806F-C2C8A0B5636C}" type="slidenum">
               <a:rPr lang="fr-FR" smtClean="0"/>
+              <a:pPr/>
               <a:t>‹N°›</a:t>
             </a:fld>
             <a:endParaRPr lang="fr-FR"/>
@@ -1743,6 +1756,7 @@
           <a:p>
             <a:fld id="{6F42DEA7-74B5-471C-821F-4935DF9D1E3D}" type="datetimeFigureOut">
               <a:rPr lang="fr-FR" smtClean="0"/>
+              <a:pPr/>
               <a:t>17/02/2015</a:t>
             </a:fld>
             <a:endParaRPr lang="fr-FR"/>
@@ -1785,6 +1799,7 @@
           <a:p>
             <a:fld id="{1746E4B8-61F3-46AC-806F-C2C8A0B5636C}" type="slidenum">
               <a:rPr lang="fr-FR" smtClean="0"/>
+              <a:pPr/>
               <a:t>‹N°›</a:t>
             </a:fld>
             <a:endParaRPr lang="fr-FR"/>
@@ -1856,6 +1871,7 @@
           <a:p>
             <a:fld id="{6F42DEA7-74B5-471C-821F-4935DF9D1E3D}" type="datetimeFigureOut">
               <a:rPr lang="fr-FR" smtClean="0"/>
+              <a:pPr/>
               <a:t>17/02/2015</a:t>
             </a:fld>
             <a:endParaRPr lang="fr-FR"/>
@@ -1898,6 +1914,7 @@
           <a:p>
             <a:fld id="{1746E4B8-61F3-46AC-806F-C2C8A0B5636C}" type="slidenum">
               <a:rPr lang="fr-FR" smtClean="0"/>
+              <a:pPr/>
               <a:t>‹N°›</a:t>
             </a:fld>
             <a:endParaRPr lang="fr-FR"/>
@@ -1946,6 +1963,7 @@
           <a:p>
             <a:fld id="{6F42DEA7-74B5-471C-821F-4935DF9D1E3D}" type="datetimeFigureOut">
               <a:rPr lang="fr-FR" smtClean="0"/>
+              <a:pPr/>
               <a:t>17/02/2015</a:t>
             </a:fld>
             <a:endParaRPr lang="fr-FR"/>
@@ -1988,6 +2006,7 @@
           <a:p>
             <a:fld id="{1746E4B8-61F3-46AC-806F-C2C8A0B5636C}" type="slidenum">
               <a:rPr lang="fr-FR" smtClean="0"/>
+              <a:pPr/>
               <a:t>‹N°›</a:t>
             </a:fld>
             <a:endParaRPr lang="fr-FR"/>
@@ -2218,6 +2237,7 @@
           <a:p>
             <a:fld id="{6F42DEA7-74B5-471C-821F-4935DF9D1E3D}" type="datetimeFigureOut">
               <a:rPr lang="fr-FR" smtClean="0"/>
+              <a:pPr/>
               <a:t>17/02/2015</a:t>
             </a:fld>
             <a:endParaRPr lang="fr-FR"/>
@@ -2260,6 +2280,7 @@
           <a:p>
             <a:fld id="{1746E4B8-61F3-46AC-806F-C2C8A0B5636C}" type="slidenum">
               <a:rPr lang="fr-FR" smtClean="0"/>
+              <a:pPr/>
               <a:t>‹N°›</a:t>
             </a:fld>
             <a:endParaRPr lang="fr-FR"/>
@@ -2466,6 +2487,7 @@
           <a:p>
             <a:fld id="{6F42DEA7-74B5-471C-821F-4935DF9D1E3D}" type="datetimeFigureOut">
               <a:rPr lang="fr-FR" smtClean="0"/>
+              <a:pPr/>
               <a:t>17/02/2015</a:t>
             </a:fld>
             <a:endParaRPr lang="fr-FR"/>
@@ -2508,6 +2530,7 @@
           <a:p>
             <a:fld id="{1746E4B8-61F3-46AC-806F-C2C8A0B5636C}" type="slidenum">
               <a:rPr lang="fr-FR" smtClean="0"/>
+              <a:pPr/>
               <a:t>‹N°›</a:t>
             </a:fld>
             <a:endParaRPr lang="fr-FR"/>
@@ -2674,6 +2697,7 @@
           <a:p>
             <a:fld id="{6F42DEA7-74B5-471C-821F-4935DF9D1E3D}" type="datetimeFigureOut">
               <a:rPr lang="fr-FR" smtClean="0"/>
+              <a:pPr/>
               <a:t>17/02/2015</a:t>
             </a:fld>
             <a:endParaRPr lang="fr-FR"/>
@@ -2752,6 +2776,7 @@
           <a:p>
             <a:fld id="{1746E4B8-61F3-46AC-806F-C2C8A0B5636C}" type="slidenum">
               <a:rPr lang="fr-FR" smtClean="0"/>
+              <a:pPr/>
               <a:t>‹N°›</a:t>
             </a:fld>
             <a:endParaRPr lang="fr-FR"/>
@@ -3059,6 +3084,41 @@
           <a:bodyPr/>
           <a:lstStyle/>
           <a:p>
+            <a:r>
+              <a:rPr lang="fr-FR" dirty="0" smtClean="0"/>
+              <a:t>High </a:t>
+            </a:r>
+            <a:r>
+              <a:rPr lang="fr-FR" dirty="0" err="1" smtClean="0"/>
+              <a:t>Resolution</a:t>
+            </a:r>
+            <a:r>
+              <a:rPr lang="fr-FR" dirty="0" smtClean="0"/>
+              <a:t> </a:t>
+            </a:r>
+            <a:br>
+              <a:rPr lang="fr-FR" dirty="0" smtClean="0"/>
+            </a:br>
+            <a:r>
+              <a:rPr lang="fr-FR" dirty="0" err="1" smtClean="0"/>
+              <a:t>Sparse</a:t>
+            </a:r>
+            <a:r>
+              <a:rPr lang="fr-FR" dirty="0" smtClean="0"/>
+              <a:t> </a:t>
+            </a:r>
+            <a:r>
+              <a:rPr lang="fr-FR" dirty="0" err="1" smtClean="0"/>
+              <a:t>Voxel</a:t>
+            </a:r>
+            <a:r>
+              <a:rPr lang="fr-FR" dirty="0" smtClean="0"/>
+              <a:t> </a:t>
+            </a:r>
+            <a:r>
+              <a:rPr lang="fr-FR" dirty="0" err="1" smtClean="0"/>
+              <a:t>DAGs</a:t>
+            </a:r>
             <a:endParaRPr lang="fr-FR" dirty="0"/>
           </a:p>
         </p:txBody>
@@ -3078,7 +3138,27 @@
           <a:bodyPr/>
           <a:lstStyle/>
           <a:p>
-            <a:endParaRPr lang="fr-FR"/>
+            <a:r>
+              <a:rPr lang="fr-FR" dirty="0" smtClean="0"/>
+              <a:t>Etienne </a:t>
+            </a:r>
+            <a:r>
+              <a:rPr lang="fr-FR" dirty="0" err="1" smtClean="0"/>
+              <a:t>Ferrier</a:t>
+            </a:r>
+            <a:r>
+              <a:rPr lang="fr-FR" dirty="0" smtClean="0"/>
+              <a:t> and </a:t>
+            </a:r>
+            <a:r>
+              <a:rPr lang="fr-FR" dirty="0" err="1" smtClean="0"/>
+              <a:t>Nikolai</a:t>
+            </a:r>
+            <a:r>
+              <a:rPr lang="fr-FR" dirty="0" smtClean="0"/>
+              <a:t> Morin</a:t>
+            </a:r>
+            <a:endParaRPr lang="fr-FR" dirty="0"/>
           </a:p>
         </p:txBody>
       </p:sp>
@@ -3124,6 +3204,114 @@
           <a:p>
             <a:r>
               <a:rPr lang="fr-FR" dirty="0" err="1" smtClean="0"/>
+              <a:t>Implementation</a:t>
+            </a:r>
+            <a:endParaRPr lang="fr-FR" dirty="0"/>
+          </a:p>
+        </p:txBody>
+      </p:sp>
+      <p:pic>
+        <p:nvPicPr>
+          <p:cNvPr id="4" name="Espace réservé du contenu 3" descr="ClassGraph.png"/>
+          <p:cNvPicPr>
+            <a:picLocks noGrp="1" noChangeAspect="1"/>
+          </p:cNvPicPr>
+          <p:nvPr>
+            <p:ph idx="1"/>
+          </p:nvPr>
+        </p:nvPicPr>
+        <p:blipFill>
+          <a:blip r:embed="rId2" cstate="print"/>
+          <a:stretch>
+            <a:fillRect/>
+          </a:stretch>
+        </p:blipFill>
+        <p:spPr>
+          <a:xfrm>
+            <a:off x="457200" y="1729312"/>
+            <a:ext cx="8229599" cy="4267739"/>
+          </a:xfrm>
+        </p:spPr>
+      </p:pic>
+      <p:sp>
+        <p:nvSpPr>
+          <p:cNvPr id="5" name="ZoneTexte 4"/>
+          <p:cNvSpPr txBox="1"/>
+          <p:nvPr/>
+        </p:nvSpPr>
+        <p:spPr>
+          <a:xfrm>
+            <a:off x="3635896" y="6021288"/>
+            <a:ext cx="1415221" cy="369332"/>
+          </a:xfrm>
+          <a:prstGeom prst="rect">
+            <a:avLst/>
+          </a:prstGeom>
+          <a:noFill/>
+        </p:spPr>
+        <p:txBody>
+          <a:bodyPr wrap="square" rtlCol="0">
+            <a:spAutoFit/>
+          </a:bodyPr>
+          <a:lstStyle/>
+          <a:p>
+            <a:r>
+              <a:rPr lang="fr-FR" dirty="0" smtClean="0">
+                <a:solidFill>
+                  <a:schemeClr val="tx2"/>
+                </a:solidFill>
+              </a:rPr>
+              <a:t>Our pipeline</a:t>
+            </a:r>
+          </a:p>
+        </p:txBody>
+      </p:sp>
+    </p:spTree>
+  </p:cSld>
+  <p:clrMapOvr>
+    <a:masterClrMapping/>
+  </p:clrMapOvr>
+</p:sld>
+</file>
+
+<file path=ppt/slides/slide11.xml><?xml version="1.0" encoding="utf-8"?>
+<p:sld xmlns:a="http://schemas.openxmlformats.org/drawingml/2006/main" xmlns:r="http://schemas.openxmlformats.org/officeDocument/2006/relationships" xmlns:p="http://schemas.openxmlformats.org/presentationml/2006/main">
+  <p:cSld>
+    <p:spTree>
+      <p:nvGrpSpPr>
+        <p:cNvPr id="1" name=""/>
+        <p:cNvGrpSpPr/>
+        <p:nvPr/>
+      </p:nvGrpSpPr>
+      <p:grpSpPr>
+        <a:xfrm>
+          <a:off x="0" y="0"/>
+          <a:ext cx="0" cy="0"/>
+          <a:chOff x="0" y="0"/>
+          <a:chExt cx="0" cy="0"/>
+        </a:xfrm>
+      </p:grpSpPr>
+      <p:sp>
+        <p:nvSpPr>
+          <p:cNvPr id="2" name="Titre 1"/>
+          <p:cNvSpPr>
+            <a:spLocks noGrp="1"/>
+          </p:cNvSpPr>
+          <p:nvPr>
+            <p:ph type="title"/>
+          </p:nvPr>
+        </p:nvSpPr>
+        <p:spPr/>
+        <p:txBody>
+          <a:bodyPr/>
+          <a:lstStyle/>
+          <a:p>
+            <a:r>
+              <a:rPr lang="fr-FR" dirty="0" smtClean="0"/>
+              <a:t>Memory </a:t>
+            </a:r>
+            <a:r>
+              <a:rPr lang="fr-FR" dirty="0" err="1" smtClean="0"/>
               <a:t>Comparison</a:t>
             </a:r>
             <a:endParaRPr lang="fr-FR" dirty="0"/>
@@ -3145,10 +3333,303 @@
           <a:bodyPr/>
           <a:lstStyle/>
           <a:p>
-            <a:endParaRPr lang="fr-FR"/>
-          </a:p>
-        </p:txBody>
-      </p:sp>
+            <a:r>
+              <a:rPr lang="fr-FR" dirty="0" smtClean="0"/>
+              <a:t>For 128</a:t>
+            </a:r>
+            <a:r>
+              <a:rPr lang="fr-FR" baseline="30000" dirty="0" smtClean="0"/>
+              <a:t>3</a:t>
+            </a:r>
+            <a:r>
+              <a:rPr lang="fr-FR" dirty="0" smtClean="0"/>
+              <a:t> rhino : </a:t>
+            </a:r>
+            <a:endParaRPr lang="fr-FR" baseline="30000" dirty="0"/>
+          </a:p>
+        </p:txBody>
+      </p:sp>
+      <p:graphicFrame>
+        <p:nvGraphicFramePr>
+          <p:cNvPr id="4" name="Espace réservé du contenu 3"/>
+          <p:cNvGraphicFramePr>
+            <a:graphicFrameLocks/>
+          </p:cNvGraphicFramePr>
+          <p:nvPr/>
+        </p:nvGraphicFramePr>
+        <p:xfrm>
+          <a:off x="1691680" y="2276872"/>
+          <a:ext cx="5486400" cy="2225040"/>
+        </p:xfrm>
+        <a:graphic>
+          <a:graphicData uri="http://schemas.openxmlformats.org/drawingml/2006/table">
+            <a:tbl>
+              <a:tblPr firstRow="1" bandRow="1">
+                <a:tableStyleId>{5C22544A-7EE6-4342-B048-85BDC9FD1C3A}</a:tableStyleId>
+              </a:tblPr>
+              <a:tblGrid>
+                <a:gridCol w="2743200"/>
+                <a:gridCol w="2743200"/>
+              </a:tblGrid>
+              <a:tr h="370840">
+                <a:tc>
+                  <a:txBody>
+                    <a:bodyPr/>
+                    <a:lstStyle/>
+                    <a:p>
+                      <a:pPr algn="ctr"/>
+                      <a:r>
+                        <a:rPr lang="fr-FR" dirty="0" err="1" smtClean="0"/>
+                        <a:t>Encoding</a:t>
+                      </a:r>
+                      <a:endParaRPr lang="fr-FR" dirty="0"/>
+                    </a:p>
+                  </a:txBody>
+                  <a:tcPr/>
+                </a:tc>
+                <a:tc>
+                  <a:txBody>
+                    <a:bodyPr/>
+                    <a:lstStyle/>
+                    <a:p>
+                      <a:pPr algn="ctr"/>
+                      <a:r>
+                        <a:rPr lang="fr-FR" dirty="0" smtClean="0"/>
+                        <a:t>Memory size</a:t>
+                      </a:r>
+                      <a:endParaRPr lang="fr-FR" dirty="0"/>
+                    </a:p>
+                  </a:txBody>
+                  <a:tcPr/>
+                </a:tc>
+              </a:tr>
+              <a:tr h="370840">
+                <a:tc>
+                  <a:txBody>
+                    <a:bodyPr/>
+                    <a:lstStyle/>
+                    <a:p>
+                      <a:r>
+                        <a:rPr lang="fr-FR" dirty="0" err="1" smtClean="0"/>
+                        <a:t>Voxel</a:t>
+                      </a:r>
+                      <a:r>
+                        <a:rPr lang="fr-FR" dirty="0" smtClean="0"/>
+                        <a:t> </a:t>
+                      </a:r>
+                      <a:r>
+                        <a:rPr lang="fr-FR" dirty="0" err="1" smtClean="0"/>
+                        <a:t>grid</a:t>
+                      </a:r>
+                      <a:endParaRPr lang="fr-FR" dirty="0"/>
+                    </a:p>
+                  </a:txBody>
+                  <a:tcPr/>
+                </a:tc>
+                <a:tc>
+                  <a:txBody>
+                    <a:bodyPr/>
+                    <a:lstStyle/>
+                    <a:p>
+                      <a:pPr algn="r"/>
+                      <a:r>
+                        <a:rPr lang="fr-FR" dirty="0" smtClean="0"/>
+                        <a:t>262 </a:t>
+                      </a:r>
+                      <a:r>
+                        <a:rPr lang="fr-FR" dirty="0" err="1" smtClean="0"/>
+                        <a:t>kB</a:t>
+                      </a:r>
+                      <a:endParaRPr lang="fr-FR" dirty="0"/>
+                    </a:p>
+                  </a:txBody>
+                  <a:tcPr/>
+                </a:tc>
+              </a:tr>
+              <a:tr h="370840">
+                <a:tc>
+                  <a:txBody>
+                    <a:bodyPr/>
+                    <a:lstStyle/>
+                    <a:p>
+                      <a:r>
+                        <a:rPr lang="fr-FR" dirty="0" smtClean="0"/>
+                        <a:t>SVO Basic</a:t>
+                      </a:r>
+                      <a:endParaRPr lang="fr-FR" dirty="0"/>
+                    </a:p>
+                  </a:txBody>
+                  <a:tcPr/>
+                </a:tc>
+                <a:tc>
+                  <a:txBody>
+                    <a:bodyPr/>
+                    <a:lstStyle/>
+                    <a:p>
+                      <a:pPr algn="r"/>
+                      <a:r>
+                        <a:rPr lang="fr-FR" dirty="0" smtClean="0"/>
+                        <a:t>180 </a:t>
+                      </a:r>
+                      <a:r>
+                        <a:rPr lang="fr-FR" dirty="0" err="1" smtClean="0"/>
+                        <a:t>kB</a:t>
+                      </a:r>
+                      <a:endParaRPr lang="fr-FR" dirty="0"/>
+                    </a:p>
+                  </a:txBody>
+                  <a:tcPr/>
+                </a:tc>
+              </a:tr>
+              <a:tr h="370840">
+                <a:tc>
+                  <a:txBody>
+                    <a:bodyPr/>
+                    <a:lstStyle/>
+                    <a:p>
+                      <a:r>
+                        <a:rPr lang="fr-FR" dirty="0" smtClean="0"/>
+                        <a:t>SVO </a:t>
+                      </a:r>
+                      <a:r>
+                        <a:rPr lang="fr-FR" dirty="0" err="1" smtClean="0"/>
+                        <a:t>Breadth</a:t>
+                      </a:r>
+                      <a:r>
+                        <a:rPr lang="fr-FR" dirty="0" smtClean="0"/>
+                        <a:t> first</a:t>
+                      </a:r>
+                      <a:endParaRPr lang="fr-FR" dirty="0"/>
+                    </a:p>
+                  </a:txBody>
+                  <a:tcPr/>
+                </a:tc>
+                <a:tc>
+                  <a:txBody>
+                    <a:bodyPr/>
+                    <a:lstStyle/>
+                    <a:p>
+                      <a:pPr algn="r"/>
+                      <a:r>
+                        <a:rPr lang="fr-FR" dirty="0" smtClean="0"/>
+                        <a:t>2.6 </a:t>
+                      </a:r>
+                      <a:r>
+                        <a:rPr lang="fr-FR" dirty="0" err="1" smtClean="0"/>
+                        <a:t>kB</a:t>
+                      </a:r>
+                      <a:endParaRPr lang="fr-FR" dirty="0"/>
+                    </a:p>
+                  </a:txBody>
+                  <a:tcPr/>
+                </a:tc>
+              </a:tr>
+              <a:tr h="370840">
+                <a:tc>
+                  <a:txBody>
+                    <a:bodyPr/>
+                    <a:lstStyle/>
+                    <a:p>
+                      <a:r>
+                        <a:rPr lang="fr-FR" dirty="0" smtClean="0"/>
+                        <a:t>SVO </a:t>
+                      </a:r>
+                      <a:r>
+                        <a:rPr lang="fr-FR" dirty="0" err="1" smtClean="0"/>
+                        <a:t>Mask</a:t>
+                      </a:r>
+                      <a:r>
+                        <a:rPr lang="fr-FR" dirty="0" smtClean="0"/>
+                        <a:t>-pointer</a:t>
+                      </a:r>
+                      <a:endParaRPr lang="fr-FR" dirty="0"/>
+                    </a:p>
+                  </a:txBody>
+                  <a:tcPr/>
+                </a:tc>
+                <a:tc>
+                  <a:txBody>
+                    <a:bodyPr/>
+                    <a:lstStyle/>
+                    <a:p>
+                      <a:pPr algn="r"/>
+                      <a:r>
+                        <a:rPr lang="fr-FR" dirty="0" smtClean="0"/>
+                        <a:t>5.6 </a:t>
+                      </a:r>
+                      <a:r>
+                        <a:rPr lang="fr-FR" dirty="0" err="1" smtClean="0"/>
+                        <a:t>kB</a:t>
+                      </a:r>
+                      <a:endParaRPr lang="fr-FR" dirty="0"/>
+                    </a:p>
+                  </a:txBody>
+                  <a:tcPr/>
+                </a:tc>
+              </a:tr>
+              <a:tr h="370840">
+                <a:tc>
+                  <a:txBody>
+                    <a:bodyPr/>
+                    <a:lstStyle/>
+                    <a:p>
+                      <a:r>
+                        <a:rPr lang="fr-FR" dirty="0" smtClean="0"/>
+                        <a:t>DAG</a:t>
+                      </a:r>
+                      <a:endParaRPr lang="fr-FR" dirty="0"/>
+                    </a:p>
+                  </a:txBody>
+                  <a:tcPr/>
+                </a:tc>
+                <a:tc>
+                  <a:txBody>
+                    <a:bodyPr/>
+                    <a:lstStyle/>
+                    <a:p>
+                      <a:pPr algn="r"/>
+                      <a:r>
+                        <a:rPr lang="fr-FR" dirty="0" smtClean="0"/>
+                        <a:t>3.3 </a:t>
+                      </a:r>
+                      <a:r>
+                        <a:rPr lang="fr-FR" dirty="0" err="1" smtClean="0"/>
+                        <a:t>kB</a:t>
+                      </a:r>
+                      <a:endParaRPr lang="fr-FR" dirty="0"/>
+                    </a:p>
+                  </a:txBody>
+                  <a:tcPr/>
+                </a:tc>
+              </a:tr>
+            </a:tbl>
+          </a:graphicData>
+        </a:graphic>
+      </p:graphicFrame>
+      <p:pic>
+        <p:nvPicPr>
+          <p:cNvPr id="5" name="Image 4" descr="128rhino.PNG"/>
+          <p:cNvPicPr>
+            <a:picLocks noChangeAspect="1"/>
+          </p:cNvPicPr>
+          <p:nvPr/>
+        </p:nvPicPr>
+        <p:blipFill>
+          <a:blip r:embed="rId2" cstate="print"/>
+          <a:stretch>
+            <a:fillRect/>
+          </a:stretch>
+        </p:blipFill>
+        <p:spPr>
+          <a:xfrm>
+            <a:off x="2627784" y="4509120"/>
+            <a:ext cx="3096057" cy="2038635"/>
+          </a:xfrm>
+          <a:prstGeom prst="rect">
+            <a:avLst/>
+          </a:prstGeom>
+        </p:spPr>
+      </p:pic>
     </p:spTree>
   </p:cSld>
   <p:clrMapOvr>
@@ -3192,8 +3673,12 @@
           <a:lstStyle/>
           <a:p>
             <a:r>
-              <a:rPr lang="fr-FR" dirty="0" smtClean="0"/>
-              <a:t>Plan</a:t>
+              <a:rPr lang="fr-FR" dirty="0" err="1" smtClean="0"/>
+              <a:t>Presentation</a:t>
+            </a:r>
+            <a:r>
+              <a:rPr lang="fr-FR" dirty="0" smtClean="0"/>
+              <a:t> plan</a:t>
             </a:r>
             <a:endParaRPr lang="fr-FR" dirty="0"/>
           </a:p>
@@ -3246,6 +3731,7 @@
               <a:rPr lang="fr-FR" dirty="0" smtClean="0"/>
               <a:t>)</a:t>
             </a:r>
+            <a:endParaRPr lang="fr-FR" dirty="0" smtClean="0"/>
           </a:p>
           <a:p>
             <a:r>
@@ -3341,11 +3827,7 @@
             <a:pPr lvl="1"/>
             <a:r>
               <a:rPr lang="fr-FR" dirty="0" smtClean="0"/>
-              <a:t>DAG </a:t>
-            </a:r>
-            <a:r>
-              <a:rPr lang="fr-FR" dirty="0" smtClean="0"/>
-              <a:t>(</a:t>
+              <a:t>DAG (</a:t>
             </a:r>
             <a:r>
               <a:rPr lang="fr-FR" dirty="0" err="1" smtClean="0"/>
@@ -3395,7 +3877,6 @@
               <a:rPr lang="fr-FR" dirty="0" smtClean="0"/>
               <a:t>)</a:t>
             </a:r>
-            <a:endParaRPr lang="fr-FR" dirty="0" smtClean="0"/>
           </a:p>
           <a:p>
             <a:r>
@@ -3492,27 +3973,313 @@
               <a:rPr lang="fr-FR" dirty="0" err="1" smtClean="0"/>
               <a:t>Context</a:t>
             </a:r>
+            <a:r>
+              <a:rPr lang="fr-FR" dirty="0" smtClean="0"/>
+              <a:t> : Alternative </a:t>
+            </a:r>
+            <a:r>
+              <a:rPr lang="fr-FR" dirty="0" err="1" smtClean="0"/>
+              <a:t>scene</a:t>
+            </a:r>
+            <a:r>
+              <a:rPr lang="fr-FR" dirty="0" smtClean="0"/>
+              <a:t> </a:t>
+            </a:r>
+            <a:r>
+              <a:rPr lang="fr-FR" dirty="0" err="1" smtClean="0"/>
+              <a:t>representation</a:t>
+            </a:r>
+            <a:r>
+              <a:rPr lang="fr-FR" dirty="0" smtClean="0"/>
+              <a:t>.</a:t>
+            </a:r>
             <a:endParaRPr lang="fr-FR" dirty="0" smtClean="0"/>
           </a:p>
           <a:p>
-            <a:r>
-              <a:rPr lang="fr-FR" dirty="0" smtClean="0"/>
-              <a:t>Objective</a:t>
-            </a:r>
-          </a:p>
-          <a:p>
-            <a:r>
-              <a:rPr lang="fr-FR" dirty="0" smtClean="0"/>
-              <a:t>(</a:t>
-            </a:r>
-            <a:r>
-              <a:rPr lang="fr-FR" dirty="0" err="1" smtClean="0"/>
-              <a:t>Result</a:t>
-            </a:r>
-            <a:r>
-              <a:rPr lang="fr-FR" dirty="0" smtClean="0"/>
-              <a:t>)</a:t>
-            </a:r>
+            <a:endParaRPr lang="fr-FR" dirty="0" smtClean="0"/>
+          </a:p>
+          <a:p>
+            <a:r>
+              <a:rPr lang="fr-FR" dirty="0" smtClean="0"/>
+              <a:t>Objective : Encode and </a:t>
+            </a:r>
+            <a:r>
+              <a:rPr lang="fr-FR" dirty="0" err="1" smtClean="0"/>
+              <a:t>manipulate</a:t>
+            </a:r>
+            <a:r>
+              <a:rPr lang="fr-FR" dirty="0" smtClean="0"/>
+              <a:t> </a:t>
+            </a:r>
+            <a:r>
+              <a:rPr lang="fr-FR" dirty="0" err="1" smtClean="0"/>
+              <a:t>huge</a:t>
+            </a:r>
+            <a:r>
+              <a:rPr lang="fr-FR" dirty="0" smtClean="0"/>
+              <a:t> </a:t>
+            </a:r>
+            <a:r>
+              <a:rPr lang="fr-FR" dirty="0" err="1" smtClean="0"/>
+              <a:t>voxel</a:t>
+            </a:r>
+            <a:r>
+              <a:rPr lang="fr-FR" dirty="0" smtClean="0"/>
+              <a:t> </a:t>
+            </a:r>
+            <a:r>
+              <a:rPr lang="fr-FR" dirty="0" err="1" smtClean="0"/>
+              <a:t>scenes</a:t>
+            </a:r>
+            <a:r>
+              <a:rPr lang="fr-FR" dirty="0" smtClean="0"/>
+              <a:t>.</a:t>
+            </a:r>
+            <a:endParaRPr lang="fr-FR" b="1" dirty="0" smtClean="0"/>
+          </a:p>
+        </p:txBody>
+      </p:sp>
+      <p:pic>
+        <p:nvPicPr>
+          <p:cNvPr id="4" name="Image 3" descr="Citadel.PNG"/>
+          <p:cNvPicPr>
+            <a:picLocks noChangeAspect="1"/>
+          </p:cNvPicPr>
+          <p:nvPr/>
+        </p:nvPicPr>
+        <p:blipFill>
+          <a:blip r:embed="rId2" cstate="print"/>
+          <a:stretch>
+            <a:fillRect/>
+          </a:stretch>
+        </p:blipFill>
+        <p:spPr>
+          <a:xfrm>
+            <a:off x="420231" y="4005064"/>
+            <a:ext cx="8387905" cy="1798335"/>
+          </a:xfrm>
+          <a:prstGeom prst="rect">
+            <a:avLst/>
+          </a:prstGeom>
+        </p:spPr>
+      </p:pic>
+      <p:sp>
+        <p:nvSpPr>
+          <p:cNvPr id="5" name="ZoneTexte 4"/>
+          <p:cNvSpPr txBox="1"/>
+          <p:nvPr/>
+        </p:nvSpPr>
+        <p:spPr>
+          <a:xfrm>
+            <a:off x="467544" y="6237312"/>
+            <a:ext cx="8352928" cy="369332"/>
+          </a:xfrm>
+          <a:prstGeom prst="rect">
+            <a:avLst/>
+          </a:prstGeom>
+          <a:noFill/>
+        </p:spPr>
+        <p:txBody>
+          <a:bodyPr wrap="square" rtlCol="0">
+            <a:spAutoFit/>
+          </a:bodyPr>
+          <a:lstStyle/>
+          <a:p>
+            <a:r>
+              <a:rPr lang="fr-FR" dirty="0" err="1" smtClean="0">
+                <a:solidFill>
+                  <a:schemeClr val="tx2"/>
+                </a:solidFill>
+              </a:rPr>
+              <a:t>Resolution</a:t>
+            </a:r>
+            <a:r>
+              <a:rPr lang="fr-FR" dirty="0" smtClean="0">
+                <a:solidFill>
+                  <a:schemeClr val="tx2"/>
+                </a:solidFill>
+              </a:rPr>
+              <a:t> : 128K</a:t>
+            </a:r>
+            <a:r>
+              <a:rPr lang="fr-FR" baseline="30000" dirty="0" smtClean="0">
+                <a:solidFill>
+                  <a:schemeClr val="tx2"/>
+                </a:solidFill>
+              </a:rPr>
+              <a:t>3   </a:t>
+            </a:r>
+            <a:r>
+              <a:rPr lang="fr-FR" dirty="0" smtClean="0">
+                <a:solidFill>
+                  <a:schemeClr val="tx2"/>
+                </a:solidFill>
+              </a:rPr>
+              <a:t> |    </a:t>
+            </a:r>
+            <a:r>
+              <a:rPr lang="fr-FR" dirty="0" err="1" smtClean="0">
+                <a:solidFill>
+                  <a:schemeClr val="tx2"/>
+                </a:solidFill>
+              </a:rPr>
+              <a:t>Voxel</a:t>
+            </a:r>
+            <a:r>
+              <a:rPr lang="fr-FR" dirty="0" smtClean="0">
+                <a:solidFill>
+                  <a:schemeClr val="tx2"/>
+                </a:solidFill>
+              </a:rPr>
+              <a:t> </a:t>
+            </a:r>
+            <a:r>
+              <a:rPr lang="fr-FR" dirty="0" err="1" smtClean="0">
+                <a:solidFill>
+                  <a:schemeClr val="tx2"/>
+                </a:solidFill>
+              </a:rPr>
+              <a:t>Octree</a:t>
+            </a:r>
+            <a:r>
+              <a:rPr lang="fr-FR" dirty="0" smtClean="0">
+                <a:solidFill>
+                  <a:schemeClr val="tx2"/>
+                </a:solidFill>
+              </a:rPr>
+              <a:t> </a:t>
+            </a:r>
+            <a:r>
+              <a:rPr lang="fr-FR" dirty="0" err="1" smtClean="0">
+                <a:solidFill>
+                  <a:schemeClr val="tx2"/>
+                </a:solidFill>
+              </a:rPr>
+              <a:t>mem</a:t>
+            </a:r>
+            <a:r>
+              <a:rPr lang="fr-FR" dirty="0" smtClean="0">
+                <a:solidFill>
+                  <a:schemeClr val="tx2"/>
+                </a:solidFill>
+              </a:rPr>
+              <a:t>. size : 5.1GB   |   DAG </a:t>
+            </a:r>
+            <a:r>
+              <a:rPr lang="fr-FR" dirty="0" err="1" smtClean="0">
+                <a:solidFill>
+                  <a:schemeClr val="tx2"/>
+                </a:solidFill>
+              </a:rPr>
+              <a:t>mem</a:t>
+            </a:r>
+            <a:r>
+              <a:rPr lang="fr-FR" dirty="0" smtClean="0">
+                <a:solidFill>
+                  <a:schemeClr val="tx2"/>
+                </a:solidFill>
+              </a:rPr>
+              <a:t>. size : 945 MB </a:t>
+            </a:r>
+            <a:endParaRPr lang="fr-FR" baseline="30000" dirty="0">
+              <a:solidFill>
+                <a:schemeClr val="tx2"/>
+              </a:solidFill>
+            </a:endParaRPr>
+          </a:p>
+        </p:txBody>
+      </p:sp>
+      <p:sp>
+        <p:nvSpPr>
+          <p:cNvPr id="6" name="ZoneTexte 5"/>
+          <p:cNvSpPr txBox="1"/>
+          <p:nvPr/>
+        </p:nvSpPr>
+        <p:spPr>
+          <a:xfrm>
+            <a:off x="2411760" y="5805264"/>
+            <a:ext cx="4032448" cy="369332"/>
+          </a:xfrm>
+          <a:prstGeom prst="rect">
+            <a:avLst/>
+          </a:prstGeom>
+          <a:noFill/>
+        </p:spPr>
+        <p:txBody>
+          <a:bodyPr wrap="square" rtlCol="0">
+            <a:spAutoFit/>
+          </a:bodyPr>
+          <a:lstStyle/>
+          <a:p>
+            <a:r>
+              <a:rPr lang="fr-FR" dirty="0" err="1" smtClean="0">
+                <a:solidFill>
+                  <a:schemeClr val="tx2"/>
+                </a:solidFill>
+              </a:rPr>
+              <a:t>Scene</a:t>
+            </a:r>
+            <a:r>
+              <a:rPr lang="fr-FR" dirty="0" smtClean="0">
+                <a:solidFill>
+                  <a:schemeClr val="tx2"/>
+                </a:solidFill>
+              </a:rPr>
+              <a:t> </a:t>
+            </a:r>
+            <a:r>
+              <a:rPr lang="fr-FR" dirty="0" err="1" smtClean="0">
+                <a:solidFill>
+                  <a:schemeClr val="tx2"/>
+                </a:solidFill>
+              </a:rPr>
+              <a:t>encoded</a:t>
+            </a:r>
+            <a:r>
+              <a:rPr lang="fr-FR" dirty="0" smtClean="0">
+                <a:solidFill>
+                  <a:schemeClr val="tx2"/>
+                </a:solidFill>
+              </a:rPr>
+              <a:t> and </a:t>
+            </a:r>
+            <a:r>
+              <a:rPr lang="fr-FR" dirty="0" err="1" smtClean="0">
+                <a:solidFill>
+                  <a:schemeClr val="tx2"/>
+                </a:solidFill>
+              </a:rPr>
+              <a:t>rendered</a:t>
+            </a:r>
+            <a:r>
+              <a:rPr lang="fr-FR" dirty="0" smtClean="0">
+                <a:solidFill>
+                  <a:schemeClr val="tx2"/>
+                </a:solidFill>
+              </a:rPr>
+              <a:t> </a:t>
+            </a:r>
+            <a:r>
+              <a:rPr lang="fr-FR" dirty="0" err="1" smtClean="0">
+                <a:solidFill>
+                  <a:schemeClr val="tx2"/>
+                </a:solidFill>
+              </a:rPr>
+              <a:t>with</a:t>
+            </a:r>
+            <a:r>
+              <a:rPr lang="fr-FR" dirty="0" smtClean="0">
+                <a:solidFill>
+                  <a:schemeClr val="tx2"/>
+                </a:solidFill>
+              </a:rPr>
+              <a:t> a DAG</a:t>
+            </a:r>
+            <a:endParaRPr lang="fr-FR" dirty="0">
+              <a:solidFill>
+                <a:schemeClr val="tx2"/>
+              </a:solidFill>
+            </a:endParaRPr>
           </a:p>
         </p:txBody>
       </p:sp>
@@ -3557,8 +4324,16 @@
           <a:lstStyle/>
           <a:p>
             <a:r>
-              <a:rPr lang="fr-FR" dirty="0" smtClean="0"/>
-              <a:t>Storage</a:t>
+              <a:rPr lang="fr-FR" dirty="0" err="1" smtClean="0"/>
+              <a:t>Voxel</a:t>
+            </a:r>
+            <a:r>
+              <a:rPr lang="fr-FR" dirty="0" smtClean="0"/>
+              <a:t> </a:t>
+            </a:r>
+            <a:r>
+              <a:rPr lang="fr-FR" dirty="0" err="1" smtClean="0"/>
+              <a:t>grid</a:t>
             </a:r>
             <a:endParaRPr lang="fr-FR" dirty="0"/>
           </a:p>
@@ -3579,7 +4354,242 @@
           <a:bodyPr/>
           <a:lstStyle/>
           <a:p>
-            <a:endParaRPr lang="fr-FR" dirty="0"/>
+            <a:r>
+              <a:rPr lang="fr-FR" dirty="0" smtClean="0"/>
+              <a:t>A 3D </a:t>
+            </a:r>
+            <a:r>
+              <a:rPr lang="fr-FR" dirty="0" err="1" smtClean="0"/>
+              <a:t>voxel</a:t>
+            </a:r>
+            <a:r>
+              <a:rPr lang="fr-FR" dirty="0" smtClean="0"/>
+              <a:t> </a:t>
+            </a:r>
+            <a:r>
+              <a:rPr lang="fr-FR" dirty="0" err="1" smtClean="0"/>
+              <a:t>matrix</a:t>
+            </a:r>
+            <a:endParaRPr lang="fr-FR" dirty="0" smtClean="0"/>
+          </a:p>
+          <a:p>
+            <a:endParaRPr lang="fr-FR" dirty="0" smtClean="0"/>
+          </a:p>
+          <a:p>
+            <a:r>
+              <a:rPr lang="fr-FR" dirty="0" err="1" smtClean="0"/>
+              <a:t>Mem</a:t>
+            </a:r>
+            <a:r>
+              <a:rPr lang="fr-FR" dirty="0" smtClean="0"/>
+              <a:t>. size : </a:t>
+            </a:r>
+            <a:r>
+              <a:rPr lang="fr-FR" dirty="0" smtClean="0">
+                <a:solidFill>
+                  <a:srgbClr val="FF0000"/>
+                </a:solidFill>
+              </a:rPr>
+              <a:t>side</a:t>
+            </a:r>
+            <a:r>
+              <a:rPr lang="fr-FR" baseline="30000" dirty="0" smtClean="0">
+                <a:solidFill>
+                  <a:srgbClr val="FF0000"/>
+                </a:solidFill>
+              </a:rPr>
+              <a:t>3</a:t>
+            </a:r>
+            <a:r>
+              <a:rPr lang="fr-FR" dirty="0" smtClean="0"/>
+              <a:t> bits.</a:t>
+            </a:r>
+            <a:endParaRPr lang="fr-FR" baseline="30000" dirty="0" smtClean="0"/>
+          </a:p>
+          <a:p>
+            <a:endParaRPr lang="fr-FR" baseline="30000" dirty="0" smtClean="0"/>
+          </a:p>
+          <a:p>
+            <a:r>
+              <a:rPr lang="fr-FR" dirty="0" err="1" smtClean="0"/>
+              <a:t>Used</a:t>
+            </a:r>
+            <a:r>
+              <a:rPr lang="fr-FR" dirty="0" smtClean="0"/>
+              <a:t> to </a:t>
+            </a:r>
+            <a:r>
+              <a:rPr lang="fr-FR" dirty="0" err="1" smtClean="0"/>
+              <a:t>convert</a:t>
+            </a:r>
+            <a:r>
+              <a:rPr lang="fr-FR" dirty="0" smtClean="0"/>
+              <a:t> a </a:t>
+            </a:r>
+            <a:r>
+              <a:rPr lang="fr-FR" dirty="0" err="1" smtClean="0"/>
+              <a:t>mesh</a:t>
+            </a:r>
+            <a:r>
+              <a:rPr lang="fr-FR" dirty="0" smtClean="0"/>
+              <a:t> to </a:t>
+            </a:r>
+          </a:p>
+          <a:p>
+            <a:pPr>
+              <a:buNone/>
+            </a:pPr>
+            <a:r>
+              <a:rPr lang="fr-FR" dirty="0" smtClean="0"/>
+              <a:t>	</a:t>
+            </a:r>
+            <a:r>
+              <a:rPr lang="fr-FR" dirty="0" smtClean="0"/>
+              <a:t>a </a:t>
+            </a:r>
+            <a:r>
+              <a:rPr lang="fr-FR" dirty="0" err="1" smtClean="0"/>
+              <a:t>voxel</a:t>
+            </a:r>
+            <a:r>
+              <a:rPr lang="fr-FR" dirty="0" smtClean="0"/>
+              <a:t> </a:t>
+            </a:r>
+            <a:r>
+              <a:rPr lang="fr-FR" dirty="0" err="1" smtClean="0"/>
+              <a:t>scene</a:t>
+            </a:r>
+            <a:endParaRPr lang="fr-FR" dirty="0" smtClean="0"/>
+          </a:p>
+        </p:txBody>
+      </p:sp>
+      <p:pic>
+        <p:nvPicPr>
+          <p:cNvPr id="5" name="Image 4" descr="rhinoClear.PNG"/>
+          <p:cNvPicPr>
+            <a:picLocks noChangeAspect="1"/>
+          </p:cNvPicPr>
+          <p:nvPr/>
+        </p:nvPicPr>
+        <p:blipFill>
+          <a:blip r:embed="rId2" cstate="print"/>
+          <a:stretch>
+            <a:fillRect/>
+          </a:stretch>
+        </p:blipFill>
+        <p:spPr>
+          <a:xfrm>
+            <a:off x="5580112" y="2132856"/>
+            <a:ext cx="3143689" cy="2219635"/>
+          </a:xfrm>
+          <a:prstGeom prst="rect">
+            <a:avLst/>
+          </a:prstGeom>
+        </p:spPr>
+      </p:pic>
+      <p:sp>
+        <p:nvSpPr>
+          <p:cNvPr id="6" name="ZoneTexte 5"/>
+          <p:cNvSpPr txBox="1"/>
+          <p:nvPr/>
+        </p:nvSpPr>
+        <p:spPr>
+          <a:xfrm>
+            <a:off x="6228184" y="4293096"/>
+            <a:ext cx="2160240" cy="646331"/>
+          </a:xfrm>
+          <a:prstGeom prst="rect">
+            <a:avLst/>
+          </a:prstGeom>
+          <a:noFill/>
+        </p:spPr>
+        <p:txBody>
+          <a:bodyPr wrap="square" rtlCol="0">
+            <a:spAutoFit/>
+          </a:bodyPr>
+          <a:lstStyle/>
+          <a:p>
+            <a:pPr algn="ctr"/>
+            <a:r>
+              <a:rPr lang="fr-FR" dirty="0" smtClean="0">
+                <a:solidFill>
+                  <a:schemeClr val="tx2"/>
+                </a:solidFill>
+              </a:rPr>
+              <a:t>64</a:t>
+            </a:r>
+            <a:r>
+              <a:rPr lang="fr-FR" baseline="30000" dirty="0" smtClean="0">
+                <a:solidFill>
+                  <a:schemeClr val="tx2"/>
+                </a:solidFill>
+              </a:rPr>
+              <a:t>3</a:t>
+            </a:r>
+            <a:r>
+              <a:rPr lang="fr-FR" dirty="0" smtClean="0">
+                <a:solidFill>
+                  <a:schemeClr val="tx2"/>
+                </a:solidFill>
+              </a:rPr>
+              <a:t> </a:t>
+            </a:r>
+            <a:r>
+              <a:rPr lang="fr-FR" dirty="0" err="1" smtClean="0">
+                <a:solidFill>
+                  <a:schemeClr val="tx2"/>
+                </a:solidFill>
+              </a:rPr>
+              <a:t>voxel</a:t>
+            </a:r>
+            <a:r>
+              <a:rPr lang="fr-FR" dirty="0" smtClean="0">
+                <a:solidFill>
+                  <a:schemeClr val="tx2"/>
+                </a:solidFill>
+              </a:rPr>
+              <a:t> </a:t>
+            </a:r>
+            <a:r>
+              <a:rPr lang="fr-FR" dirty="0" err="1" smtClean="0">
+                <a:solidFill>
+                  <a:schemeClr val="tx2"/>
+                </a:solidFill>
+              </a:rPr>
+              <a:t>grid</a:t>
+            </a:r>
+            <a:r>
+              <a:rPr lang="fr-FR" dirty="0" smtClean="0">
+                <a:solidFill>
+                  <a:schemeClr val="tx2"/>
+                </a:solidFill>
+              </a:rPr>
+              <a:t> rhino </a:t>
+            </a:r>
+          </a:p>
+          <a:p>
+            <a:pPr algn="ctr"/>
+            <a:r>
+              <a:rPr lang="fr-FR" b="1" dirty="0" smtClean="0">
+                <a:solidFill>
+                  <a:schemeClr val="tx2"/>
+                </a:solidFill>
+              </a:rPr>
+              <a:t>32 </a:t>
+            </a:r>
+            <a:r>
+              <a:rPr lang="fr-FR" b="1" dirty="0" err="1" smtClean="0">
+                <a:solidFill>
+                  <a:schemeClr val="tx2"/>
+                </a:solidFill>
+              </a:rPr>
+              <a:t>kB</a:t>
+            </a:r>
+            <a:endParaRPr lang="fr-FR" b="1" dirty="0" smtClean="0">
+              <a:solidFill>
+                <a:schemeClr val="tx2"/>
+              </a:solidFill>
+            </a:endParaRPr>
           </a:p>
         </p:txBody>
       </p:sp>
@@ -3625,6 +4635,14 @@
           <a:p>
             <a:r>
               <a:rPr lang="fr-FR" dirty="0" err="1" smtClean="0"/>
+              <a:t>Sparse</a:t>
+            </a:r>
+            <a:r>
+              <a:rPr lang="fr-FR" dirty="0" smtClean="0"/>
+              <a:t> </a:t>
+            </a:r>
+            <a:r>
+              <a:rPr lang="fr-FR" dirty="0" err="1" smtClean="0"/>
               <a:t>Voxel</a:t>
             </a:r>
             <a:r>
@@ -3633,7 +4651,11 @@
             </a:r>
             <a:r>
               <a:rPr lang="fr-FR" dirty="0" err="1" smtClean="0"/>
-              <a:t>grid</a:t>
+              <a:t>Octree</a:t>
+            </a:r>
+            <a:r>
+              <a:rPr lang="fr-FR" dirty="0" smtClean="0"/>
+              <a:t> (SVO)</a:t>
             </a:r>
             <a:endParaRPr lang="fr-FR" dirty="0"/>
           </a:p>
@@ -3651,10 +4673,310 @@
         </p:nvSpPr>
         <p:spPr/>
         <p:txBody>
-          <a:bodyPr/>
-          <a:lstStyle/>
-          <a:p>
-            <a:endParaRPr lang="fr-FR"/>
+          <a:bodyPr>
+            <a:normAutofit/>
+          </a:bodyPr>
+          <a:lstStyle/>
+          <a:p>
+            <a:r>
+              <a:rPr lang="fr-FR" dirty="0" smtClean="0"/>
+              <a:t>8 </a:t>
+            </a:r>
+            <a:r>
+              <a:rPr lang="fr-FR" dirty="0" err="1" smtClean="0"/>
+              <a:t>children</a:t>
+            </a:r>
+            <a:r>
+              <a:rPr lang="fr-FR" dirty="0" smtClean="0"/>
+              <a:t> per </a:t>
+            </a:r>
+            <a:r>
+              <a:rPr lang="fr-FR" dirty="0" err="1" smtClean="0"/>
+              <a:t>node</a:t>
+            </a:r>
+            <a:r>
+              <a:rPr lang="fr-FR" dirty="0" smtClean="0"/>
+              <a:t> :</a:t>
+            </a:r>
+          </a:p>
+          <a:p>
+            <a:endParaRPr lang="fr-FR" dirty="0" smtClean="0"/>
+          </a:p>
+          <a:p>
+            <a:endParaRPr lang="fr-FR" dirty="0" smtClean="0"/>
+          </a:p>
+          <a:p>
+            <a:endParaRPr lang="fr-FR" dirty="0" smtClean="0"/>
+          </a:p>
+          <a:p>
+            <a:r>
+              <a:rPr lang="fr-FR" dirty="0" err="1" smtClean="0"/>
+              <a:t>Mem</a:t>
+            </a:r>
+            <a:r>
+              <a:rPr lang="fr-FR" dirty="0" smtClean="0"/>
+              <a:t>. Size : </a:t>
+            </a:r>
+          </a:p>
+          <a:p>
+            <a:pPr lvl="1"/>
+            <a:r>
+              <a:rPr lang="fr-FR" dirty="0" smtClean="0"/>
+              <a:t> </a:t>
+            </a:r>
+            <a:r>
+              <a:rPr lang="fr-FR" dirty="0" smtClean="0">
+                <a:solidFill>
+                  <a:srgbClr val="92D050"/>
+                </a:solidFill>
+              </a:rPr>
+              <a:t>32</a:t>
+            </a:r>
+            <a:r>
+              <a:rPr lang="fr-FR" dirty="0" smtClean="0"/>
+              <a:t> + </a:t>
+            </a:r>
+            <a:r>
+              <a:rPr lang="fr-FR" dirty="0" smtClean="0">
+                <a:solidFill>
+                  <a:srgbClr val="0070C0"/>
+                </a:solidFill>
+              </a:rPr>
+              <a:t>8</a:t>
+            </a:r>
+            <a:r>
+              <a:rPr lang="fr-FR" dirty="0" smtClean="0"/>
+              <a:t> = </a:t>
+            </a:r>
+            <a:r>
+              <a:rPr lang="fr-FR" dirty="0" smtClean="0">
+                <a:solidFill>
+                  <a:srgbClr val="FF0000"/>
+                </a:solidFill>
+              </a:rPr>
+              <a:t>40</a:t>
+            </a:r>
+            <a:r>
+              <a:rPr lang="fr-FR" dirty="0" smtClean="0"/>
+              <a:t> bits per </a:t>
+            </a:r>
+            <a:r>
+              <a:rPr lang="fr-FR" dirty="0" err="1" smtClean="0"/>
+              <a:t>leaf</a:t>
+            </a:r>
+            <a:endParaRPr lang="fr-FR" dirty="0" smtClean="0"/>
+          </a:p>
+          <a:p>
+            <a:pPr lvl="1"/>
+            <a:r>
+              <a:rPr lang="fr-FR" dirty="0" smtClean="0"/>
+              <a:t> </a:t>
+            </a:r>
+            <a:r>
+              <a:rPr lang="fr-FR" dirty="0" smtClean="0">
+                <a:solidFill>
+                  <a:srgbClr val="92D050"/>
+                </a:solidFill>
+              </a:rPr>
+              <a:t>32*8</a:t>
+            </a:r>
+            <a:r>
+              <a:rPr lang="fr-FR" dirty="0" smtClean="0"/>
+              <a:t> + </a:t>
+            </a:r>
+            <a:r>
+              <a:rPr lang="fr-FR" dirty="0" smtClean="0">
+                <a:solidFill>
+                  <a:srgbClr val="0070C0"/>
+                </a:solidFill>
+              </a:rPr>
+              <a:t>8</a:t>
+            </a:r>
+            <a:r>
+              <a:rPr lang="fr-FR" dirty="0" smtClean="0"/>
+              <a:t> = </a:t>
+            </a:r>
+            <a:r>
+              <a:rPr lang="fr-FR" dirty="0" smtClean="0">
+                <a:solidFill>
+                  <a:srgbClr val="FF0000"/>
+                </a:solidFill>
+              </a:rPr>
+              <a:t>264</a:t>
+            </a:r>
+            <a:r>
+              <a:rPr lang="fr-FR" dirty="0" smtClean="0"/>
+              <a:t> bits per </a:t>
+            </a:r>
+            <a:r>
+              <a:rPr lang="fr-FR" dirty="0" err="1" smtClean="0"/>
+              <a:t>internal</a:t>
+            </a:r>
+            <a:r>
+              <a:rPr lang="fr-FR" dirty="0" smtClean="0"/>
+              <a:t> </a:t>
+            </a:r>
+            <a:r>
+              <a:rPr lang="fr-FR" dirty="0" err="1" smtClean="0"/>
+              <a:t>node</a:t>
+            </a:r>
+            <a:endParaRPr lang="fr-FR" dirty="0" smtClean="0"/>
+          </a:p>
+          <a:p>
+            <a:endParaRPr lang="fr-FR" dirty="0" smtClean="0"/>
+          </a:p>
+          <a:p>
+            <a:pPr>
+              <a:buNone/>
+            </a:pPr>
+            <a:endParaRPr lang="fr-FR" dirty="0" smtClean="0"/>
+          </a:p>
+          <a:p>
+            <a:endParaRPr lang="fr-FR" dirty="0"/>
+          </a:p>
+        </p:txBody>
+      </p:sp>
+      <p:pic>
+        <p:nvPicPr>
+          <p:cNvPr id="4" name="Image 3" descr="octreeCode.PNG"/>
+          <p:cNvPicPr>
+            <a:picLocks noChangeAspect="1"/>
+          </p:cNvPicPr>
+          <p:nvPr/>
+        </p:nvPicPr>
+        <p:blipFill>
+          <a:blip r:embed="rId2" cstate="print"/>
+          <a:srcRect/>
+          <a:stretch>
+            <a:fillRect/>
+          </a:stretch>
+        </p:blipFill>
+        <p:spPr>
+          <a:xfrm>
+            <a:off x="1475656" y="2214953"/>
+            <a:ext cx="2505425" cy="1286055"/>
+          </a:xfrm>
+          <a:prstGeom prst="rect">
+            <a:avLst/>
+          </a:prstGeom>
+        </p:spPr>
+      </p:pic>
+      <p:pic>
+        <p:nvPicPr>
+          <p:cNvPr id="6" name="Image 5" descr="rhinoOctree.PNG"/>
+          <p:cNvPicPr>
+            <a:picLocks noChangeAspect="1"/>
+          </p:cNvPicPr>
+          <p:nvPr/>
+        </p:nvPicPr>
+        <p:blipFill>
+          <a:blip r:embed="rId3" cstate="print"/>
+          <a:stretch>
+            <a:fillRect/>
+          </a:stretch>
+        </p:blipFill>
+        <p:spPr>
+          <a:xfrm>
+            <a:off x="5868144" y="1916832"/>
+            <a:ext cx="2905531" cy="2086266"/>
+          </a:xfrm>
+          <a:prstGeom prst="rect">
+            <a:avLst/>
+          </a:prstGeom>
+        </p:spPr>
+      </p:pic>
+      <p:sp>
+        <p:nvSpPr>
+          <p:cNvPr id="7" name="ZoneTexte 6"/>
+          <p:cNvSpPr txBox="1"/>
+          <p:nvPr/>
+        </p:nvSpPr>
+        <p:spPr>
+          <a:xfrm>
+            <a:off x="6300192" y="4005064"/>
+            <a:ext cx="2160240" cy="646331"/>
+          </a:xfrm>
+          <a:prstGeom prst="rect">
+            <a:avLst/>
+          </a:prstGeom>
+          <a:noFill/>
+        </p:spPr>
+        <p:txBody>
+          <a:bodyPr wrap="square" rtlCol="0">
+            <a:spAutoFit/>
+          </a:bodyPr>
+          <a:lstStyle/>
+          <a:p>
+            <a:pPr algn="ctr"/>
+            <a:r>
+              <a:rPr lang="fr-FR" dirty="0" smtClean="0">
+                <a:solidFill>
+                  <a:schemeClr val="tx2"/>
+                </a:solidFill>
+              </a:rPr>
+              <a:t>64</a:t>
+            </a:r>
+            <a:r>
+              <a:rPr lang="fr-FR" baseline="30000" dirty="0" smtClean="0">
+                <a:solidFill>
+                  <a:schemeClr val="tx2"/>
+                </a:solidFill>
+              </a:rPr>
+              <a:t>3</a:t>
+            </a:r>
+            <a:r>
+              <a:rPr lang="fr-FR" dirty="0" smtClean="0">
+                <a:solidFill>
+                  <a:schemeClr val="tx2"/>
+                </a:solidFill>
+              </a:rPr>
+              <a:t> </a:t>
+            </a:r>
+            <a:r>
+              <a:rPr lang="fr-FR" dirty="0" err="1" smtClean="0">
+                <a:solidFill>
+                  <a:schemeClr val="tx2"/>
+                </a:solidFill>
+              </a:rPr>
+              <a:t>octree</a:t>
+            </a:r>
+            <a:r>
+              <a:rPr lang="fr-FR" dirty="0" smtClean="0">
+                <a:solidFill>
+                  <a:schemeClr val="tx2"/>
+                </a:solidFill>
+              </a:rPr>
+              <a:t> rhino </a:t>
+            </a:r>
+            <a:endParaRPr lang="fr-FR" dirty="0" smtClean="0">
+              <a:solidFill>
+                <a:schemeClr val="tx2"/>
+              </a:solidFill>
+            </a:endParaRPr>
+          </a:p>
+          <a:p>
+            <a:pPr algn="ctr"/>
+            <a:r>
+              <a:rPr lang="fr-FR" b="1" dirty="0" smtClean="0">
+                <a:solidFill>
+                  <a:schemeClr val="tx2"/>
+                </a:solidFill>
+              </a:rPr>
+              <a:t>45 </a:t>
+            </a:r>
+            <a:r>
+              <a:rPr lang="fr-FR" b="1" dirty="0" err="1" smtClean="0">
+                <a:solidFill>
+                  <a:schemeClr val="tx2"/>
+                </a:solidFill>
+              </a:rPr>
+              <a:t>kB</a:t>
+            </a:r>
+            <a:endParaRPr lang="fr-FR" b="1" dirty="0" smtClean="0">
+              <a:solidFill>
+                <a:schemeClr val="tx2"/>
+              </a:solidFill>
+            </a:endParaRPr>
           </a:p>
         </p:txBody>
       </p:sp>
@@ -3699,8 +5021,20 @@
           <a:lstStyle/>
           <a:p>
             <a:r>
-              <a:rPr lang="fr-FR" dirty="0" err="1" smtClean="0"/>
-              <a:t>Octree</a:t>
+              <a:rPr lang="fr-FR" dirty="0" smtClean="0"/>
+              <a:t>SVO </a:t>
+            </a:r>
+            <a:r>
+              <a:rPr lang="fr-FR" dirty="0" err="1" smtClean="0"/>
+              <a:t>Breath</a:t>
+            </a:r>
+            <a:r>
+              <a:rPr lang="fr-FR" dirty="0" smtClean="0"/>
+              <a:t> First </a:t>
+            </a:r>
+            <a:r>
+              <a:rPr lang="fr-FR" dirty="0" err="1" smtClean="0"/>
+              <a:t>Encoding</a:t>
             </a:r>
             <a:endParaRPr lang="fr-FR" dirty="0"/>
           </a:p>
@@ -3721,10 +5055,349 @@
           <a:bodyPr/>
           <a:lstStyle/>
           <a:p>
-            <a:endParaRPr lang="fr-FR"/>
-          </a:p>
-        </p:txBody>
-      </p:sp>
+            <a:r>
+              <a:rPr lang="fr-FR" dirty="0" smtClean="0"/>
+              <a:t>One </a:t>
+            </a:r>
+            <a:r>
+              <a:rPr lang="fr-FR" dirty="0" err="1" smtClean="0"/>
+              <a:t>child</a:t>
+            </a:r>
+            <a:r>
+              <a:rPr lang="fr-FR" dirty="0" smtClean="0"/>
+              <a:t> </a:t>
+            </a:r>
+            <a:r>
+              <a:rPr lang="fr-FR" dirty="0" err="1" smtClean="0"/>
+              <a:t>mask</a:t>
+            </a:r>
+            <a:r>
+              <a:rPr lang="fr-FR" dirty="0" smtClean="0"/>
+              <a:t> per </a:t>
+            </a:r>
+            <a:r>
+              <a:rPr lang="fr-FR" dirty="0" err="1" smtClean="0"/>
+              <a:t>internal</a:t>
+            </a:r>
+            <a:r>
+              <a:rPr lang="fr-FR" dirty="0" smtClean="0"/>
+              <a:t> </a:t>
+            </a:r>
+            <a:r>
+              <a:rPr lang="fr-FR" dirty="0" err="1" smtClean="0"/>
+              <a:t>node</a:t>
+            </a:r>
+            <a:endParaRPr lang="fr-FR" dirty="0" smtClean="0"/>
+          </a:p>
+          <a:p>
+            <a:pPr lvl="1"/>
+            <a:r>
+              <a:rPr lang="fr-FR" dirty="0" err="1" smtClean="0"/>
+              <a:t>Listed</a:t>
+            </a:r>
+            <a:r>
+              <a:rPr lang="fr-FR" dirty="0" smtClean="0"/>
+              <a:t> in </a:t>
+            </a:r>
+            <a:r>
+              <a:rPr lang="fr-FR" i="1" dirty="0" err="1" smtClean="0"/>
+              <a:t>breath</a:t>
+            </a:r>
+            <a:r>
+              <a:rPr lang="fr-FR" i="1" dirty="0" smtClean="0"/>
+              <a:t> first </a:t>
+            </a:r>
+            <a:r>
+              <a:rPr lang="fr-FR" dirty="0" err="1" smtClean="0"/>
+              <a:t>order</a:t>
+            </a:r>
+            <a:endParaRPr lang="fr-FR" dirty="0" smtClean="0"/>
+          </a:p>
+          <a:p>
+            <a:pPr lvl="1"/>
+            <a:r>
+              <a:rPr lang="fr-FR" dirty="0" smtClean="0"/>
+              <a:t>Ex : </a:t>
+            </a:r>
+          </a:p>
+          <a:p>
+            <a:r>
+              <a:rPr lang="fr-FR" dirty="0" err="1" smtClean="0"/>
+              <a:t>Mem</a:t>
+            </a:r>
+            <a:r>
+              <a:rPr lang="fr-FR" dirty="0" smtClean="0"/>
+              <a:t>. Size :</a:t>
+            </a:r>
+          </a:p>
+          <a:p>
+            <a:pPr lvl="1"/>
+            <a:r>
+              <a:rPr lang="fr-FR" dirty="0" smtClean="0"/>
+              <a:t> </a:t>
+            </a:r>
+            <a:r>
+              <a:rPr lang="fr-FR" dirty="0" smtClean="0">
+                <a:solidFill>
+                  <a:srgbClr val="FF0000"/>
+                </a:solidFill>
+              </a:rPr>
+              <a:t>8</a:t>
+            </a:r>
+            <a:r>
+              <a:rPr lang="fr-FR" dirty="0" smtClean="0"/>
+              <a:t> bits per </a:t>
+            </a:r>
+            <a:r>
+              <a:rPr lang="fr-FR" dirty="0" err="1" smtClean="0"/>
+              <a:t>internal</a:t>
+            </a:r>
+            <a:r>
+              <a:rPr lang="fr-FR" dirty="0" smtClean="0"/>
+              <a:t> </a:t>
+            </a:r>
+            <a:r>
+              <a:rPr lang="fr-FR" dirty="0" err="1" smtClean="0"/>
+              <a:t>node</a:t>
+            </a:r>
+            <a:endParaRPr lang="fr-FR" dirty="0" smtClean="0"/>
+          </a:p>
+          <a:p>
+            <a:pPr lvl="1"/>
+            <a:r>
+              <a:rPr lang="fr-FR" dirty="0" smtClean="0"/>
+              <a:t> </a:t>
+            </a:r>
+            <a:r>
+              <a:rPr lang="fr-FR" dirty="0" smtClean="0">
+                <a:solidFill>
+                  <a:srgbClr val="FF0000"/>
+                </a:solidFill>
+              </a:rPr>
+              <a:t>0</a:t>
+            </a:r>
+            <a:r>
+              <a:rPr lang="fr-FR" dirty="0" smtClean="0"/>
+              <a:t> bit per </a:t>
+            </a:r>
+            <a:r>
+              <a:rPr lang="fr-FR" dirty="0" err="1" smtClean="0"/>
+              <a:t>leaf</a:t>
+            </a:r>
+            <a:endParaRPr lang="fr-FR" dirty="0" smtClean="0"/>
+          </a:p>
+          <a:p>
+            <a:pPr lvl="1"/>
+            <a:endParaRPr lang="fr-FR" dirty="0" smtClean="0"/>
+          </a:p>
+          <a:p>
+            <a:r>
+              <a:rPr lang="fr-FR" dirty="0" err="1" smtClean="0"/>
+              <a:t>Only</a:t>
+            </a:r>
+            <a:r>
+              <a:rPr lang="fr-FR" dirty="0" smtClean="0"/>
+              <a:t> good for </a:t>
+            </a:r>
+            <a:r>
+              <a:rPr lang="fr-FR" dirty="0" err="1" smtClean="0"/>
+              <a:t>storage</a:t>
+            </a:r>
+            <a:endParaRPr lang="fr-FR" dirty="0" smtClean="0"/>
+          </a:p>
+        </p:txBody>
+      </p:sp>
+      <p:pic>
+        <p:nvPicPr>
+          <p:cNvPr id="4" name="Image 3" descr="rhinoOctree.PNG"/>
+          <p:cNvPicPr>
+            <a:picLocks noChangeAspect="1"/>
+          </p:cNvPicPr>
+          <p:nvPr/>
+        </p:nvPicPr>
+        <p:blipFill>
+          <a:blip r:embed="rId2" cstate="print"/>
+          <a:stretch>
+            <a:fillRect/>
+          </a:stretch>
+        </p:blipFill>
+        <p:spPr>
+          <a:xfrm>
+            <a:off x="5868144" y="3070701"/>
+            <a:ext cx="2905531" cy="2086266"/>
+          </a:xfrm>
+          <a:prstGeom prst="rect">
+            <a:avLst/>
+          </a:prstGeom>
+        </p:spPr>
+      </p:pic>
+      <p:sp>
+        <p:nvSpPr>
+          <p:cNvPr id="5" name="ZoneTexte 4"/>
+          <p:cNvSpPr txBox="1"/>
+          <p:nvPr/>
+        </p:nvSpPr>
+        <p:spPr>
+          <a:xfrm>
+            <a:off x="6300192" y="5158933"/>
+            <a:ext cx="2160240" cy="646331"/>
+          </a:xfrm>
+          <a:prstGeom prst="rect">
+            <a:avLst/>
+          </a:prstGeom>
+          <a:noFill/>
+        </p:spPr>
+        <p:txBody>
+          <a:bodyPr wrap="square" rtlCol="0">
+            <a:spAutoFit/>
+          </a:bodyPr>
+          <a:lstStyle/>
+          <a:p>
+            <a:pPr algn="ctr"/>
+            <a:r>
+              <a:rPr lang="fr-FR" dirty="0" smtClean="0">
+                <a:solidFill>
+                  <a:schemeClr val="tx2"/>
+                </a:solidFill>
+              </a:rPr>
+              <a:t>64</a:t>
+            </a:r>
+            <a:r>
+              <a:rPr lang="fr-FR" baseline="30000" dirty="0" smtClean="0">
+                <a:solidFill>
+                  <a:schemeClr val="tx2"/>
+                </a:solidFill>
+              </a:rPr>
+              <a:t>3</a:t>
+            </a:r>
+            <a:r>
+              <a:rPr lang="fr-FR" dirty="0" smtClean="0">
+                <a:solidFill>
+                  <a:schemeClr val="tx2"/>
+                </a:solidFill>
+              </a:rPr>
+              <a:t> </a:t>
+            </a:r>
+            <a:r>
+              <a:rPr lang="fr-FR" dirty="0" err="1" smtClean="0">
+                <a:solidFill>
+                  <a:schemeClr val="tx2"/>
+                </a:solidFill>
+              </a:rPr>
+              <a:t>octree</a:t>
+            </a:r>
+            <a:r>
+              <a:rPr lang="fr-FR" dirty="0" smtClean="0">
+                <a:solidFill>
+                  <a:schemeClr val="tx2"/>
+                </a:solidFill>
+              </a:rPr>
+              <a:t> rhino </a:t>
+            </a:r>
+            <a:endParaRPr lang="fr-FR" dirty="0" smtClean="0">
+              <a:solidFill>
+                <a:schemeClr val="tx2"/>
+              </a:solidFill>
+            </a:endParaRPr>
+          </a:p>
+          <a:p>
+            <a:pPr algn="ctr"/>
+            <a:r>
+              <a:rPr lang="fr-FR" b="1" dirty="0" smtClean="0">
+                <a:solidFill>
+                  <a:schemeClr val="tx2"/>
+                </a:solidFill>
+              </a:rPr>
+              <a:t>670 B</a:t>
+            </a:r>
+            <a:endParaRPr lang="fr-FR" b="1" dirty="0" smtClean="0">
+              <a:solidFill>
+                <a:schemeClr val="tx2"/>
+              </a:solidFill>
+            </a:endParaRPr>
+          </a:p>
+        </p:txBody>
+      </p:sp>
+      <p:graphicFrame>
+        <p:nvGraphicFramePr>
+          <p:cNvPr id="6" name="Tableau 5"/>
+          <p:cNvGraphicFramePr>
+            <a:graphicFrameLocks noGrp="1"/>
+          </p:cNvGraphicFramePr>
+          <p:nvPr/>
+        </p:nvGraphicFramePr>
+        <p:xfrm>
+          <a:off x="1979712" y="2780928"/>
+          <a:ext cx="3600399" cy="370840"/>
+        </p:xfrm>
+        <a:graphic>
+          <a:graphicData uri="http://schemas.openxmlformats.org/drawingml/2006/table">
+            <a:tbl>
+              <a:tblPr firstRow="1" bandRow="1">
+                <a:tableStyleId>{5C22544A-7EE6-4342-B048-85BDC9FD1C3A}</a:tableStyleId>
+              </a:tblPr>
+              <a:tblGrid>
+                <a:gridCol w="1152127"/>
+                <a:gridCol w="1296144"/>
+                <a:gridCol w="1152128"/>
+              </a:tblGrid>
+              <a:tr h="370840">
+                <a:tc>
+                  <a:txBody>
+                    <a:bodyPr/>
+                    <a:lstStyle/>
+                    <a:p>
+                      <a:pPr algn="ctr"/>
+                      <a:r>
+                        <a:rPr lang="fr-FR" dirty="0" smtClean="0"/>
+                        <a:t>01000001</a:t>
+                      </a:r>
+                      <a:endParaRPr lang="fr-FR" dirty="0"/>
+                    </a:p>
+                  </a:txBody>
+                  <a:tcPr>
+                    <a:solidFill>
+                      <a:schemeClr val="tx2">
+                        <a:lumMod val="75000"/>
+                      </a:schemeClr>
+                    </a:solidFill>
+                  </a:tcPr>
+                </a:tc>
+                <a:tc>
+                  <a:txBody>
+                    <a:bodyPr/>
+                    <a:lstStyle/>
+                    <a:p>
+                      <a:pPr algn="ctr"/>
+                      <a:r>
+                        <a:rPr lang="fr-FR" dirty="0" smtClean="0"/>
+                        <a:t>10100100</a:t>
+                      </a:r>
+                      <a:endParaRPr lang="fr-FR" dirty="0"/>
+                    </a:p>
+                  </a:txBody>
+                  <a:tcPr/>
+                </a:tc>
+                <a:tc>
+                  <a:txBody>
+                    <a:bodyPr/>
+                    <a:lstStyle/>
+                    <a:p>
+                      <a:pPr algn="ctr"/>
+                      <a:r>
+                        <a:rPr lang="fr-FR" dirty="0" smtClean="0"/>
+                        <a:t>00000100</a:t>
+                      </a:r>
+                      <a:endParaRPr lang="fr-FR" dirty="0"/>
+                    </a:p>
+                  </a:txBody>
+                  <a:tcPr/>
+                </a:tc>
+              </a:tr>
+            </a:tbl>
+          </a:graphicData>
+        </a:graphic>
+      </p:graphicFrame>
     </p:spTree>
   </p:cSld>
   <p:clrMapOvr>
@@ -3767,11 +5440,48 @@
           <a:p>
             <a:r>
               <a:rPr lang="fr-FR" dirty="0" smtClean="0"/>
-              <a:t>Storage-</a:t>
-            </a:r>
-            <a:r>
-              <a:rPr lang="fr-FR" dirty="0" err="1" smtClean="0"/>
-              <a:t>optimized</a:t>
+              <a:t>SVO </a:t>
+            </a:r>
+            <a:r>
+              <a:rPr lang="fr-FR" dirty="0" err="1" smtClean="0"/>
+              <a:t>Mask</a:t>
+            </a:r>
+            <a:r>
+              <a:rPr lang="fr-FR" dirty="0" smtClean="0"/>
+              <a:t>-pointer </a:t>
+            </a:r>
+            <a:r>
+              <a:rPr lang="fr-FR" dirty="0" err="1" smtClean="0"/>
+              <a:t>encoding</a:t>
+            </a:r>
+            <a:endParaRPr lang="fr-FR" dirty="0"/>
+          </a:p>
+        </p:txBody>
+      </p:sp>
+      <p:sp>
+        <p:nvSpPr>
+          <p:cNvPr id="3" name="Espace réservé du contenu 2"/>
+          <p:cNvSpPr>
+            <a:spLocks noGrp="1"/>
+          </p:cNvSpPr>
+          <p:nvPr>
+            <p:ph idx="1"/>
+          </p:nvPr>
+        </p:nvSpPr>
+        <p:spPr/>
+        <p:txBody>
+          <a:bodyPr>
+            <a:normAutofit fontScale="92500" lnSpcReduction="10000"/>
+          </a:bodyPr>
+          <a:lstStyle/>
+          <a:p>
+            <a:r>
+              <a:rPr lang="fr-FR" dirty="0" smtClean="0"/>
+              <a:t>Per </a:t>
+            </a:r>
+            <a:r>
+              <a:rPr lang="fr-FR" dirty="0" err="1" smtClean="0"/>
+              <a:t>internal</a:t>
             </a:r>
             <a:r>
               <a:rPr lang="fr-FR" dirty="0" smtClean="0"/>
@@ -3779,31 +5489,605 @@
             </a:r>
             <a:r>
               <a:rPr lang="fr-FR" dirty="0" err="1" smtClean="0"/>
+              <a:t>node</a:t>
+            </a:r>
+            <a:r>
+              <a:rPr lang="fr-FR" dirty="0" smtClean="0"/>
+              <a:t> :</a:t>
+            </a:r>
+          </a:p>
+          <a:p>
+            <a:pPr lvl="1"/>
+            <a:r>
+              <a:rPr lang="fr-FR" dirty="0" smtClean="0"/>
+              <a:t>One pointer to the first non-</a:t>
+            </a:r>
+            <a:r>
+              <a:rPr lang="fr-FR" dirty="0" err="1" smtClean="0"/>
+              <a:t>empty</a:t>
+            </a:r>
+            <a:r>
+              <a:rPr lang="fr-FR" dirty="0" smtClean="0"/>
+              <a:t> </a:t>
+            </a:r>
+            <a:r>
+              <a:rPr lang="fr-FR" dirty="0" err="1" smtClean="0"/>
+              <a:t>child</a:t>
+            </a:r>
+            <a:r>
+              <a:rPr lang="fr-FR" dirty="0" smtClean="0"/>
+              <a:t> </a:t>
+            </a:r>
+          </a:p>
+          <a:p>
+            <a:pPr lvl="1"/>
+            <a:r>
+              <a:rPr lang="fr-FR" dirty="0" smtClean="0"/>
+              <a:t>One </a:t>
+            </a:r>
+            <a:r>
+              <a:rPr lang="fr-FR" dirty="0" err="1" smtClean="0"/>
+              <a:t>child</a:t>
+            </a:r>
+            <a:r>
+              <a:rPr lang="fr-FR" dirty="0" smtClean="0"/>
+              <a:t> </a:t>
+            </a:r>
+            <a:r>
+              <a:rPr lang="fr-FR" dirty="0" err="1" smtClean="0"/>
+              <a:t>mask</a:t>
+            </a:r>
+            <a:endParaRPr lang="fr-FR" dirty="0" smtClean="0"/>
+          </a:p>
+          <a:p>
+            <a:pPr lvl="1"/>
+            <a:r>
+              <a:rPr lang="fr-FR" dirty="0" smtClean="0"/>
+              <a:t>Ex : </a:t>
+            </a:r>
+          </a:p>
+          <a:p>
+            <a:pPr lvl="1">
+              <a:buNone/>
+            </a:pPr>
+            <a:r>
+              <a:rPr lang="fr-FR" dirty="0" smtClean="0"/>
+              <a:t>	</a:t>
+            </a:r>
+            <a:endParaRPr lang="fr-FR" dirty="0" smtClean="0"/>
+          </a:p>
+          <a:p>
+            <a:pPr>
+              <a:buNone/>
+            </a:pPr>
+            <a:endParaRPr lang="fr-FR" dirty="0" smtClean="0"/>
+          </a:p>
+          <a:p>
+            <a:endParaRPr lang="fr-FR" dirty="0" smtClean="0"/>
+          </a:p>
+          <a:p>
+            <a:endParaRPr lang="fr-FR" dirty="0" smtClean="0"/>
+          </a:p>
+          <a:p>
+            <a:r>
+              <a:rPr lang="fr-FR" dirty="0" err="1" smtClean="0"/>
+              <a:t>Mem</a:t>
+            </a:r>
+            <a:r>
+              <a:rPr lang="fr-FR" dirty="0" smtClean="0"/>
+              <a:t>. size : </a:t>
+            </a:r>
+            <a:r>
+              <a:rPr lang="fr-FR" dirty="0" smtClean="0">
+                <a:solidFill>
+                  <a:srgbClr val="92D050"/>
+                </a:solidFill>
+              </a:rPr>
+              <a:t>32</a:t>
+            </a:r>
+            <a:r>
+              <a:rPr lang="fr-FR" dirty="0" smtClean="0"/>
+              <a:t> + </a:t>
+            </a:r>
+            <a:r>
+              <a:rPr lang="fr-FR" dirty="0" smtClean="0">
+                <a:solidFill>
+                  <a:schemeClr val="tx2">
+                    <a:lumMod val="60000"/>
+                    <a:lumOff val="40000"/>
+                  </a:schemeClr>
+                </a:solidFill>
+              </a:rPr>
+              <a:t>8</a:t>
+            </a:r>
+            <a:r>
+              <a:rPr lang="fr-FR" dirty="0" smtClean="0"/>
+              <a:t> = </a:t>
+            </a:r>
+            <a:r>
+              <a:rPr lang="fr-FR" dirty="0" smtClean="0">
+                <a:solidFill>
+                  <a:srgbClr val="FF0000"/>
+                </a:solidFill>
+              </a:rPr>
+              <a:t>40</a:t>
+            </a:r>
+            <a:r>
+              <a:rPr lang="fr-FR" dirty="0" smtClean="0"/>
+              <a:t> bits per </a:t>
+            </a:r>
+            <a:r>
+              <a:rPr lang="fr-FR" dirty="0" err="1" smtClean="0"/>
+              <a:t>internal</a:t>
+            </a:r>
+            <a:r>
+              <a:rPr lang="fr-FR" dirty="0" smtClean="0"/>
+              <a:t> </a:t>
+            </a:r>
+            <a:r>
+              <a:rPr lang="fr-FR" dirty="0" err="1" smtClean="0"/>
+              <a:t>node</a:t>
+            </a:r>
+            <a:endParaRPr lang="fr-FR" dirty="0" smtClean="0"/>
+          </a:p>
+          <a:p>
+            <a:pPr lvl="1"/>
+            <a:endParaRPr lang="fr-FR" dirty="0" smtClean="0"/>
+          </a:p>
+          <a:p>
+            <a:endParaRPr lang="fr-FR" dirty="0" smtClean="0"/>
+          </a:p>
+        </p:txBody>
+      </p:sp>
+      <p:pic>
+        <p:nvPicPr>
+          <p:cNvPr id="4" name="Image 3" descr="rhinoOctree.PNG"/>
+          <p:cNvPicPr>
+            <a:picLocks noChangeAspect="1"/>
+          </p:cNvPicPr>
+          <p:nvPr/>
+        </p:nvPicPr>
+        <p:blipFill>
+          <a:blip r:embed="rId2" cstate="print"/>
+          <a:stretch>
+            <a:fillRect/>
+          </a:stretch>
+        </p:blipFill>
+        <p:spPr>
+          <a:xfrm>
+            <a:off x="5364088" y="2564904"/>
+            <a:ext cx="2905531" cy="2086266"/>
+          </a:xfrm>
+          <a:prstGeom prst="rect">
+            <a:avLst/>
+          </a:prstGeom>
+        </p:spPr>
+      </p:pic>
+      <p:sp>
+        <p:nvSpPr>
+          <p:cNvPr id="5" name="ZoneTexte 4"/>
+          <p:cNvSpPr txBox="1"/>
+          <p:nvPr/>
+        </p:nvSpPr>
+        <p:spPr>
+          <a:xfrm>
+            <a:off x="5796136" y="4653136"/>
+            <a:ext cx="2160240" cy="646331"/>
+          </a:xfrm>
+          <a:prstGeom prst="rect">
+            <a:avLst/>
+          </a:prstGeom>
+          <a:noFill/>
+        </p:spPr>
+        <p:txBody>
+          <a:bodyPr wrap="square" rtlCol="0">
+            <a:spAutoFit/>
+          </a:bodyPr>
+          <a:lstStyle/>
+          <a:p>
+            <a:pPr algn="ctr"/>
+            <a:r>
+              <a:rPr lang="fr-FR" dirty="0" smtClean="0">
+                <a:solidFill>
+                  <a:schemeClr val="tx2"/>
+                </a:solidFill>
+              </a:rPr>
+              <a:t>64</a:t>
+            </a:r>
+            <a:r>
+              <a:rPr lang="fr-FR" baseline="30000" dirty="0" smtClean="0">
+                <a:solidFill>
+                  <a:schemeClr val="tx2"/>
+                </a:solidFill>
+              </a:rPr>
+              <a:t>3</a:t>
+            </a:r>
+            <a:r>
+              <a:rPr lang="fr-FR" dirty="0" smtClean="0">
+                <a:solidFill>
+                  <a:schemeClr val="tx2"/>
+                </a:solidFill>
+              </a:rPr>
+              <a:t> </a:t>
+            </a:r>
+            <a:r>
+              <a:rPr lang="fr-FR" dirty="0" err="1" smtClean="0">
+                <a:solidFill>
+                  <a:schemeClr val="tx2"/>
+                </a:solidFill>
+              </a:rPr>
               <a:t>octree</a:t>
             </a:r>
-            <a:endParaRPr lang="fr-FR" dirty="0"/>
-          </a:p>
-        </p:txBody>
-      </p:sp>
-      <p:sp>
-        <p:nvSpPr>
-          <p:cNvPr id="3" name="Espace réservé du contenu 2"/>
-          <p:cNvSpPr>
-            <a:spLocks noGrp="1"/>
-          </p:cNvSpPr>
-          <p:nvPr>
-            <p:ph idx="1"/>
-          </p:nvPr>
-        </p:nvSpPr>
-        <p:spPr/>
-        <p:txBody>
-          <a:bodyPr/>
-          <a:lstStyle/>
-          <a:p>
-            <a:endParaRPr lang="fr-FR"/>
-          </a:p>
-        </p:txBody>
-      </p:sp>
+            <a:r>
+              <a:rPr lang="fr-FR" dirty="0" smtClean="0">
+                <a:solidFill>
+                  <a:schemeClr val="tx2"/>
+                </a:solidFill>
+              </a:rPr>
+              <a:t> rhino </a:t>
+            </a:r>
+            <a:endParaRPr lang="fr-FR" dirty="0" smtClean="0">
+              <a:solidFill>
+                <a:schemeClr val="tx2"/>
+              </a:solidFill>
+            </a:endParaRPr>
+          </a:p>
+          <a:p>
+            <a:pPr algn="ctr"/>
+            <a:r>
+              <a:rPr lang="fr-FR" b="1" dirty="0" smtClean="0">
+                <a:solidFill>
+                  <a:schemeClr val="tx2"/>
+                </a:solidFill>
+              </a:rPr>
+              <a:t>3 </a:t>
+            </a:r>
+            <a:r>
+              <a:rPr lang="fr-FR" b="1" dirty="0" err="1" smtClean="0">
+                <a:solidFill>
+                  <a:schemeClr val="tx2"/>
+                </a:solidFill>
+              </a:rPr>
+              <a:t>kB</a:t>
+            </a:r>
+            <a:endParaRPr lang="fr-FR" b="1" dirty="0" smtClean="0">
+              <a:solidFill>
+                <a:schemeClr val="tx2"/>
+              </a:solidFill>
+            </a:endParaRPr>
+          </a:p>
+        </p:txBody>
+      </p:sp>
+      <p:graphicFrame>
+        <p:nvGraphicFramePr>
+          <p:cNvPr id="7" name="Tableau 6"/>
+          <p:cNvGraphicFramePr>
+            <a:graphicFrameLocks noGrp="1"/>
+          </p:cNvGraphicFramePr>
+          <p:nvPr/>
+        </p:nvGraphicFramePr>
+        <p:xfrm>
+          <a:off x="1907704" y="3068960"/>
+          <a:ext cx="1512168" cy="1838425"/>
+        </p:xfrm>
+        <a:graphic>
+          <a:graphicData uri="http://schemas.openxmlformats.org/drawingml/2006/table">
+            <a:tbl>
+              <a:tblPr bandRow="1">
+                <a:tableStyleId>{5C22544A-7EE6-4342-B048-85BDC9FD1C3A}</a:tableStyleId>
+              </a:tblPr>
+              <a:tblGrid>
+                <a:gridCol w="1259586"/>
+                <a:gridCol w="252582"/>
+              </a:tblGrid>
+              <a:tr h="367685">
+                <a:tc>
+                  <a:txBody>
+                    <a:bodyPr/>
+                    <a:lstStyle/>
+                    <a:p>
+                      <a:pPr algn="ctr"/>
+                      <a:r>
+                        <a:rPr lang="fr-FR" b="1" dirty="0" smtClean="0">
+                          <a:solidFill>
+                            <a:schemeClr val="bg1"/>
+                          </a:solidFill>
+                        </a:rPr>
+                        <a:t>01000001</a:t>
+                      </a:r>
+                      <a:endParaRPr lang="fr-FR" b="1" dirty="0">
+                        <a:solidFill>
+                          <a:schemeClr val="bg1"/>
+                        </a:solidFill>
+                      </a:endParaRPr>
+                    </a:p>
+                  </a:txBody>
+                  <a:tcPr>
+                    <a:solidFill>
+                      <a:schemeClr val="tx2">
+                        <a:lumMod val="75000"/>
+                      </a:schemeClr>
+                    </a:solidFill>
+                  </a:tcPr>
+                </a:tc>
+                <a:tc>
+                  <a:txBody>
+                    <a:bodyPr/>
+                    <a:lstStyle/>
+                    <a:p>
+                      <a:pPr algn="ctr"/>
+                      <a:r>
+                        <a:rPr lang="fr-FR" b="1" dirty="0" smtClean="0">
+                          <a:solidFill>
+                            <a:schemeClr val="bg1"/>
+                          </a:solidFill>
+                        </a:rPr>
+                        <a:t>1</a:t>
+                      </a:r>
+                      <a:endParaRPr lang="fr-FR" b="1" dirty="0">
+                        <a:solidFill>
+                          <a:schemeClr val="bg1"/>
+                        </a:solidFill>
+                      </a:endParaRPr>
+                    </a:p>
+                  </a:txBody>
+                  <a:tcPr>
+                    <a:solidFill>
+                      <a:schemeClr val="accent3">
+                        <a:lumMod val="75000"/>
+                      </a:schemeClr>
+                    </a:solidFill>
+                  </a:tcPr>
+                </a:tc>
+              </a:tr>
+              <a:tr h="367685">
+                <a:tc>
+                  <a:txBody>
+                    <a:bodyPr/>
+                    <a:lstStyle/>
+                    <a:p>
+                      <a:pPr algn="ctr"/>
+                      <a:r>
+                        <a:rPr lang="fr-FR" b="1" dirty="0" smtClean="0">
+                          <a:solidFill>
+                            <a:schemeClr val="bg1"/>
+                          </a:solidFill>
+                        </a:rPr>
+                        <a:t>00010000</a:t>
+                      </a:r>
+                      <a:endParaRPr lang="fr-FR" b="1" dirty="0">
+                        <a:solidFill>
+                          <a:schemeClr val="bg1"/>
+                        </a:solidFill>
+                      </a:endParaRPr>
+                    </a:p>
+                  </a:txBody>
+                  <a:tcPr>
+                    <a:solidFill>
+                      <a:schemeClr val="tx2">
+                        <a:lumMod val="60000"/>
+                        <a:lumOff val="40000"/>
+                      </a:schemeClr>
+                    </a:solidFill>
+                  </a:tcPr>
+                </a:tc>
+                <a:tc>
+                  <a:txBody>
+                    <a:bodyPr/>
+                    <a:lstStyle/>
+                    <a:p>
+                      <a:pPr algn="ctr"/>
+                      <a:r>
+                        <a:rPr lang="fr-FR" b="1" dirty="0" smtClean="0">
+                          <a:solidFill>
+                            <a:schemeClr val="bg1"/>
+                          </a:solidFill>
+                        </a:rPr>
+                        <a:t>3</a:t>
+                      </a:r>
+                      <a:endParaRPr lang="fr-FR" b="1" dirty="0">
+                        <a:solidFill>
+                          <a:schemeClr val="bg1"/>
+                        </a:solidFill>
+                      </a:endParaRPr>
+                    </a:p>
+                  </a:txBody>
+                  <a:tcPr>
+                    <a:solidFill>
+                      <a:schemeClr val="accent3">
+                        <a:lumMod val="60000"/>
+                        <a:lumOff val="40000"/>
+                      </a:schemeClr>
+                    </a:solidFill>
+                  </a:tcPr>
+                </a:tc>
+              </a:tr>
+              <a:tr h="367685">
+                <a:tc>
+                  <a:txBody>
+                    <a:bodyPr/>
+                    <a:lstStyle/>
+                    <a:p>
+                      <a:pPr algn="ctr"/>
+                      <a:r>
+                        <a:rPr lang="fr-FR" b="1" dirty="0" smtClean="0">
+                          <a:solidFill>
+                            <a:schemeClr val="bg1"/>
+                          </a:solidFill>
+                        </a:rPr>
+                        <a:t>00001000</a:t>
+                      </a:r>
+                      <a:endParaRPr lang="fr-FR" b="1" dirty="0">
+                        <a:solidFill>
+                          <a:schemeClr val="bg1"/>
+                        </a:solidFill>
+                      </a:endParaRPr>
+                    </a:p>
+                  </a:txBody>
+                  <a:tcPr>
+                    <a:solidFill>
+                      <a:schemeClr val="tx2">
+                        <a:lumMod val="75000"/>
+                      </a:schemeClr>
+                    </a:solidFill>
+                  </a:tcPr>
+                </a:tc>
+                <a:tc>
+                  <a:txBody>
+                    <a:bodyPr/>
+                    <a:lstStyle/>
+                    <a:p>
+                      <a:pPr algn="ctr"/>
+                      <a:r>
+                        <a:rPr lang="fr-FR" b="1" dirty="0" smtClean="0">
+                          <a:solidFill>
+                            <a:schemeClr val="bg1"/>
+                          </a:solidFill>
+                        </a:rPr>
+                        <a:t>4</a:t>
+                      </a:r>
+                      <a:endParaRPr lang="fr-FR" b="1" dirty="0">
+                        <a:solidFill>
+                          <a:schemeClr val="bg1"/>
+                        </a:solidFill>
+                      </a:endParaRPr>
+                    </a:p>
+                  </a:txBody>
+                  <a:tcPr>
+                    <a:solidFill>
+                      <a:schemeClr val="accent3">
+                        <a:lumMod val="75000"/>
+                      </a:schemeClr>
+                    </a:solidFill>
+                  </a:tcPr>
+                </a:tc>
+              </a:tr>
+              <a:tr h="367685">
+                <a:tc>
+                  <a:txBody>
+                    <a:bodyPr/>
+                    <a:lstStyle/>
+                    <a:p>
+                      <a:pPr algn="ctr"/>
+                      <a:r>
+                        <a:rPr lang="fr-FR" b="1" dirty="0" smtClean="0">
+                          <a:solidFill>
+                            <a:schemeClr val="bg1"/>
+                          </a:solidFill>
+                        </a:rPr>
+                        <a:t>11000100</a:t>
+                      </a:r>
+                      <a:endParaRPr lang="fr-FR" b="1" dirty="0">
+                        <a:solidFill>
+                          <a:schemeClr val="bg1"/>
+                        </a:solidFill>
+                      </a:endParaRPr>
+                    </a:p>
+                  </a:txBody>
+                  <a:tcPr>
+                    <a:solidFill>
+                      <a:schemeClr val="tx2">
+                        <a:lumMod val="60000"/>
+                        <a:lumOff val="40000"/>
+                      </a:schemeClr>
+                    </a:solidFill>
+                  </a:tcPr>
+                </a:tc>
+                <a:tc>
+                  <a:txBody>
+                    <a:bodyPr/>
+                    <a:lstStyle/>
+                    <a:p>
+                      <a:pPr algn="ctr"/>
+                      <a:r>
+                        <a:rPr lang="fr-FR" b="1" dirty="0" smtClean="0">
+                          <a:solidFill>
+                            <a:schemeClr val="bg1"/>
+                          </a:solidFill>
+                        </a:rPr>
+                        <a:t>0</a:t>
+                      </a:r>
+                      <a:endParaRPr lang="fr-FR" b="1" dirty="0">
+                        <a:solidFill>
+                          <a:schemeClr val="bg1"/>
+                        </a:solidFill>
+                      </a:endParaRPr>
+                    </a:p>
+                  </a:txBody>
+                  <a:tcPr>
+                    <a:solidFill>
+                      <a:schemeClr val="accent3">
+                        <a:lumMod val="60000"/>
+                        <a:lumOff val="40000"/>
+                      </a:schemeClr>
+                    </a:solidFill>
+                  </a:tcPr>
+                </a:tc>
+              </a:tr>
+              <a:tr h="367685">
+                <a:tc>
+                  <a:txBody>
+                    <a:bodyPr/>
+                    <a:lstStyle/>
+                    <a:p>
+                      <a:pPr algn="ctr"/>
+                      <a:r>
+                        <a:rPr lang="fr-FR" b="1" dirty="0" smtClean="0">
+                          <a:solidFill>
+                            <a:schemeClr val="bg1"/>
+                          </a:solidFill>
+                        </a:rPr>
+                        <a:t>00011110</a:t>
+                      </a:r>
+                      <a:endParaRPr lang="fr-FR" b="1" dirty="0">
+                        <a:solidFill>
+                          <a:schemeClr val="bg1"/>
+                        </a:solidFill>
+                      </a:endParaRPr>
+                    </a:p>
+                  </a:txBody>
+                  <a:tcPr>
+                    <a:solidFill>
+                      <a:schemeClr val="tx2">
+                        <a:lumMod val="75000"/>
+                      </a:schemeClr>
+                    </a:solidFill>
+                  </a:tcPr>
+                </a:tc>
+                <a:tc>
+                  <a:txBody>
+                    <a:bodyPr/>
+                    <a:lstStyle/>
+                    <a:p>
+                      <a:pPr algn="ctr"/>
+                      <a:r>
+                        <a:rPr lang="fr-FR" b="1" dirty="0" smtClean="0">
+                          <a:solidFill>
+                            <a:schemeClr val="bg1"/>
+                          </a:solidFill>
+                        </a:rPr>
+                        <a:t>0</a:t>
+                      </a:r>
+                      <a:endParaRPr lang="fr-FR" b="1" dirty="0">
+                        <a:solidFill>
+                          <a:schemeClr val="bg1"/>
+                        </a:solidFill>
+                      </a:endParaRPr>
+                    </a:p>
+                  </a:txBody>
+                  <a:tcPr>
+                    <a:solidFill>
+                      <a:schemeClr val="accent3">
+                        <a:lumMod val="75000"/>
+                      </a:schemeClr>
+                    </a:solidFill>
+                  </a:tcPr>
+                </a:tc>
+              </a:tr>
+            </a:tbl>
+          </a:graphicData>
+        </a:graphic>
+      </p:graphicFrame>
     </p:spTree>
   </p:cSld>
   <p:clrMapOvr>

</xml_diff>